<commit_message>
Added antoine part. icp left
</commit_message>
<xml_diff>
--- a/Presentation/MAGMA Presentation.pptx
+++ b/Presentation/MAGMA Presentation.pptx
@@ -5,22 +5,28 @@
     <p:sldMasterId id="2147483648" r:id="rId1"/>
   </p:sldMasterIdLst>
   <p:handoutMasterIdLst>
-    <p:handoutMasterId r:id="rId15"/>
+    <p:handoutMasterId r:id="rId21"/>
   </p:handoutMasterIdLst>
   <p:sldIdLst>
     <p:sldId id="256" r:id="rId2"/>
     <p:sldId id="257" r:id="rId3"/>
     <p:sldId id="260" r:id="rId4"/>
     <p:sldId id="261" r:id="rId5"/>
-    <p:sldId id="266" r:id="rId6"/>
-    <p:sldId id="267" r:id="rId7"/>
-    <p:sldId id="262" r:id="rId8"/>
-    <p:sldId id="263" r:id="rId9"/>
-    <p:sldId id="264" r:id="rId10"/>
-    <p:sldId id="265" r:id="rId11"/>
-    <p:sldId id="258" r:id="rId12"/>
-    <p:sldId id="259" r:id="rId13"/>
-    <p:sldId id="268" r:id="rId14"/>
+    <p:sldId id="269" r:id="rId6"/>
+    <p:sldId id="270" r:id="rId7"/>
+    <p:sldId id="271" r:id="rId8"/>
+    <p:sldId id="272" r:id="rId9"/>
+    <p:sldId id="273" r:id="rId10"/>
+    <p:sldId id="266" r:id="rId11"/>
+    <p:sldId id="267" r:id="rId12"/>
+    <p:sldId id="262" r:id="rId13"/>
+    <p:sldId id="263" r:id="rId14"/>
+    <p:sldId id="264" r:id="rId15"/>
+    <p:sldId id="265" r:id="rId16"/>
+    <p:sldId id="258" r:id="rId17"/>
+    <p:sldId id="259" r:id="rId18"/>
+    <p:sldId id="268" r:id="rId19"/>
+    <p:sldId id="274" r:id="rId20"/>
   </p:sldIdLst>
   <p:sldSz cx="12192000" cy="6858000"/>
   <p:notesSz cx="6858000" cy="9144000"/>
@@ -306,7 +312,7 @@
           <a:p>
             <a:fld id="{7F7270B0-FE68-4028-B367-495A1F77F935}" type="slidenum">
               <a:rPr lang="en-US" smtClean="0"/>
-              <a:t>‹nº›</a:t>
+              <a:t>‹#›</a:t>
             </a:fld>
             <a:endParaRPr lang="en-US"/>
           </a:p>
@@ -540,7 +546,7 @@
           <a:p>
             <a:fld id="{84563150-1304-452B-90AB-6F924A6BCF5F}" type="slidenum">
               <a:rPr lang="en-US" smtClean="0"/>
-              <a:t>‹nº›</a:t>
+              <a:t>‹#›</a:t>
             </a:fld>
             <a:endParaRPr lang="en-US"/>
           </a:p>
@@ -828,7 +834,7 @@
           <a:p>
             <a:fld id="{84563150-1304-452B-90AB-6F924A6BCF5F}" type="slidenum">
               <a:rPr lang="en-US" smtClean="0"/>
-              <a:t>‹nº›</a:t>
+              <a:t>‹#›</a:t>
             </a:fld>
             <a:endParaRPr lang="en-US"/>
           </a:p>
@@ -1038,7 +1044,7 @@
           <a:p>
             <a:fld id="{84563150-1304-452B-90AB-6F924A6BCF5F}" type="slidenum">
               <a:rPr lang="en-US" smtClean="0"/>
-              <a:t>‹nº›</a:t>
+              <a:t>‹#›</a:t>
             </a:fld>
             <a:endParaRPr lang="en-US"/>
           </a:p>
@@ -1238,7 +1244,7 @@
           <a:p>
             <a:fld id="{84563150-1304-452B-90AB-6F924A6BCF5F}" type="slidenum">
               <a:rPr lang="en-US" smtClean="0"/>
-              <a:t>‹nº›</a:t>
+              <a:t>‹#›</a:t>
             </a:fld>
             <a:endParaRPr lang="en-US"/>
           </a:p>
@@ -1514,7 +1520,7 @@
           <a:p>
             <a:fld id="{84563150-1304-452B-90AB-6F924A6BCF5F}" type="slidenum">
               <a:rPr lang="en-US" smtClean="0"/>
-              <a:t>‹nº›</a:t>
+              <a:t>‹#›</a:t>
             </a:fld>
             <a:endParaRPr lang="en-US"/>
           </a:p>
@@ -1782,7 +1788,7 @@
           <a:p>
             <a:fld id="{84563150-1304-452B-90AB-6F924A6BCF5F}" type="slidenum">
               <a:rPr lang="en-US" smtClean="0"/>
-              <a:t>‹nº›</a:t>
+              <a:t>‹#›</a:t>
             </a:fld>
             <a:endParaRPr lang="en-US"/>
           </a:p>
@@ -2197,7 +2203,7 @@
           <a:p>
             <a:fld id="{84563150-1304-452B-90AB-6F924A6BCF5F}" type="slidenum">
               <a:rPr lang="en-US" smtClean="0"/>
-              <a:t>‹nº›</a:t>
+              <a:t>‹#›</a:t>
             </a:fld>
             <a:endParaRPr lang="en-US"/>
           </a:p>
@@ -2339,7 +2345,7 @@
           <a:p>
             <a:fld id="{84563150-1304-452B-90AB-6F924A6BCF5F}" type="slidenum">
               <a:rPr lang="en-US" smtClean="0"/>
-              <a:t>‹nº›</a:t>
+              <a:t>‹#›</a:t>
             </a:fld>
             <a:endParaRPr lang="en-US"/>
           </a:p>
@@ -2452,7 +2458,7 @@
           <a:p>
             <a:fld id="{84563150-1304-452B-90AB-6F924A6BCF5F}" type="slidenum">
               <a:rPr lang="en-US" smtClean="0"/>
-              <a:t>‹nº›</a:t>
+              <a:t>‹#›</a:t>
             </a:fld>
             <a:endParaRPr lang="en-US"/>
           </a:p>
@@ -2765,7 +2771,7 @@
           <a:p>
             <a:fld id="{84563150-1304-452B-90AB-6F924A6BCF5F}" type="slidenum">
               <a:rPr lang="en-US" smtClean="0"/>
-              <a:t>‹nº›</a:t>
+              <a:t>‹#›</a:t>
             </a:fld>
             <a:endParaRPr lang="en-US"/>
           </a:p>
@@ -3054,7 +3060,7 @@
           <a:p>
             <a:fld id="{84563150-1304-452B-90AB-6F924A6BCF5F}" type="slidenum">
               <a:rPr lang="en-US" smtClean="0"/>
-              <a:t>‹nº›</a:t>
+              <a:t>‹#›</a:t>
             </a:fld>
             <a:endParaRPr lang="en-US"/>
           </a:p>
@@ -3333,7 +3339,7 @@
           <a:p>
             <a:fld id="{84563150-1304-452B-90AB-6F924A6BCF5F}" type="slidenum">
               <a:rPr lang="en-US" smtClean="0"/>
-              <a:t>‹nº›</a:t>
+              <a:t>‹#›</a:t>
             </a:fld>
             <a:endParaRPr lang="en-US"/>
           </a:p>
@@ -3932,6 +3938,715 @@
       </p:grpSpPr>
       <p:sp>
         <p:nvSpPr>
+          <p:cNvPr id="2" name="Título 1">
+            <a:extLst>
+              <a:ext uri="{FF2B5EF4-FFF2-40B4-BE49-F238E27FC236}">
+                <a16:creationId xmlns:a16="http://schemas.microsoft.com/office/drawing/2014/main" id="{2903DB59-31D9-40AC-9D02-9E05E2690438}"/>
+              </a:ext>
+            </a:extLst>
+          </p:cNvPr>
+          <p:cNvSpPr>
+            <a:spLocks noGrp="1"/>
+          </p:cNvSpPr>
+          <p:nvPr>
+            <p:ph type="title"/>
+          </p:nvPr>
+        </p:nvSpPr>
+        <p:spPr/>
+        <p:txBody>
+          <a:bodyPr/>
+          <a:lstStyle/>
+          <a:p>
+            <a:r>
+              <a:rPr lang="pt-BR" dirty="0" err="1"/>
+              <a:t>Logger</a:t>
+            </a:r>
+            <a:endParaRPr lang="en-US" dirty="0"/>
+          </a:p>
+        </p:txBody>
+      </p:sp>
+      <p:pic>
+        <p:nvPicPr>
+          <p:cNvPr id="6" name="Espaço Reservado para Conteúdo 5" descr="Uma imagem contendo captura de tela&#10;&#10;Descrição gerada com muito alta confiança">
+            <a:extLst>
+              <a:ext uri="{FF2B5EF4-FFF2-40B4-BE49-F238E27FC236}">
+                <a16:creationId xmlns:a16="http://schemas.microsoft.com/office/drawing/2014/main" id="{42271960-5DC9-4474-9D6A-370ACBE93406}"/>
+              </a:ext>
+            </a:extLst>
+          </p:cNvPr>
+          <p:cNvPicPr>
+            <a:picLocks noGrp="1" noChangeAspect="1"/>
+          </p:cNvPicPr>
+          <p:nvPr>
+            <p:ph sz="half" idx="1"/>
+          </p:nvPr>
+        </p:nvPicPr>
+        <p:blipFill>
+          <a:blip r:embed="rId2">
+            <a:extLst>
+              <a:ext uri="{28A0092B-C50C-407E-A947-70E740481C1C}">
+                <a14:useLocalDpi xmlns:a14="http://schemas.microsoft.com/office/drawing/2010/main" val="0"/>
+              </a:ext>
+            </a:extLst>
+          </a:blip>
+          <a:stretch>
+            <a:fillRect/>
+          </a:stretch>
+        </p:blipFill>
+        <p:spPr>
+          <a:xfrm>
+            <a:off x="5066522" y="1653412"/>
+            <a:ext cx="3933825" cy="885825"/>
+          </a:xfrm>
+        </p:spPr>
+      </p:pic>
+      <p:sp>
+        <p:nvSpPr>
+          <p:cNvPr id="7" name="Espaço Reservado para Conteúdo 6">
+            <a:extLst>
+              <a:ext uri="{FF2B5EF4-FFF2-40B4-BE49-F238E27FC236}">
+                <a16:creationId xmlns:a16="http://schemas.microsoft.com/office/drawing/2014/main" id="{846AE223-E159-4B57-96D2-2425165C8458}"/>
+              </a:ext>
+            </a:extLst>
+          </p:cNvPr>
+          <p:cNvSpPr>
+            <a:spLocks noGrp="1"/>
+          </p:cNvSpPr>
+          <p:nvPr>
+            <p:ph sz="half" idx="2"/>
+          </p:nvPr>
+        </p:nvSpPr>
+        <p:spPr>
+          <a:xfrm>
+            <a:off x="5066522" y="2892489"/>
+            <a:ext cx="6287278" cy="3284473"/>
+          </a:xfrm>
+        </p:spPr>
+        <p:txBody>
+          <a:bodyPr/>
+          <a:lstStyle/>
+          <a:p>
+            <a:r>
+              <a:rPr lang="pt-BR" dirty="0"/>
+              <a:t>Debug </a:t>
+            </a:r>
+            <a:r>
+              <a:rPr lang="pt-BR" dirty="0" err="1"/>
+              <a:t>feature</a:t>
+            </a:r>
+            <a:endParaRPr lang="pt-BR" dirty="0"/>
+          </a:p>
+          <a:p>
+            <a:r>
+              <a:rPr lang="pt-BR" dirty="0" err="1"/>
+              <a:t>Singleton</a:t>
+            </a:r>
+            <a:r>
+              <a:rPr lang="pt-BR" dirty="0"/>
+              <a:t> design</a:t>
+            </a:r>
+          </a:p>
+          <a:p>
+            <a:r>
+              <a:rPr lang="pt-BR" dirty="0" err="1"/>
+              <a:t>Signal</a:t>
+            </a:r>
+            <a:r>
+              <a:rPr lang="pt-BR" dirty="0"/>
+              <a:t> / slots</a:t>
+            </a:r>
+          </a:p>
+          <a:p>
+            <a:r>
+              <a:rPr lang="pt-BR" dirty="0" err="1"/>
+              <a:t>Easiness</a:t>
+            </a:r>
+            <a:r>
+              <a:rPr lang="pt-BR" dirty="0"/>
+              <a:t> </a:t>
+            </a:r>
+            <a:r>
+              <a:rPr lang="pt-BR" dirty="0" err="1"/>
+              <a:t>of</a:t>
+            </a:r>
+            <a:r>
+              <a:rPr lang="pt-BR" dirty="0"/>
+              <a:t> use</a:t>
+            </a:r>
+            <a:endParaRPr lang="en-US" dirty="0"/>
+          </a:p>
+        </p:txBody>
+      </p:sp>
+      <p:pic>
+        <p:nvPicPr>
+          <p:cNvPr id="4" name="Imagem 3">
+            <a:extLst>
+              <a:ext uri="{FF2B5EF4-FFF2-40B4-BE49-F238E27FC236}">
+                <a16:creationId xmlns:a16="http://schemas.microsoft.com/office/drawing/2014/main" id="{16B277ED-18EF-40AD-B880-2CA021A80B43}"/>
+              </a:ext>
+            </a:extLst>
+          </p:cNvPr>
+          <p:cNvPicPr>
+            <a:picLocks noChangeAspect="1"/>
+          </p:cNvPicPr>
+          <p:nvPr/>
+        </p:nvPicPr>
+        <p:blipFill>
+          <a:blip r:embed="rId3"/>
+          <a:stretch>
+            <a:fillRect/>
+          </a:stretch>
+        </p:blipFill>
+        <p:spPr>
+          <a:xfrm>
+            <a:off x="1929878" y="1761687"/>
+            <a:ext cx="1685925" cy="3971925"/>
+          </a:xfrm>
+          <a:prstGeom prst="rect">
+            <a:avLst/>
+          </a:prstGeom>
+        </p:spPr>
+      </p:pic>
+    </p:spTree>
+    <p:extLst>
+      <p:ext uri="{BB962C8B-B14F-4D97-AF65-F5344CB8AC3E}">
+        <p14:creationId xmlns:p14="http://schemas.microsoft.com/office/powerpoint/2010/main" val="82065633"/>
+      </p:ext>
+    </p:extLst>
+  </p:cSld>
+  <p:clrMapOvr>
+    <a:masterClrMapping/>
+  </p:clrMapOvr>
+</p:sld>
+</file>
+
+<file path=ppt/slides/slide11.xml><?xml version="1.0" encoding="utf-8"?>
+<p:sld xmlns:a="http://schemas.openxmlformats.org/drawingml/2006/main" xmlns:r="http://schemas.openxmlformats.org/officeDocument/2006/relationships" xmlns:p="http://schemas.openxmlformats.org/presentationml/2006/main">
+  <p:cSld>
+    <p:spTree>
+      <p:nvGrpSpPr>
+        <p:cNvPr id="1" name=""/>
+        <p:cNvGrpSpPr/>
+        <p:nvPr/>
+      </p:nvGrpSpPr>
+      <p:grpSpPr>
+        <a:xfrm>
+          <a:off x="0" y="0"/>
+          <a:ext cx="0" cy="0"/>
+          <a:chOff x="0" y="0"/>
+          <a:chExt cx="0" cy="0"/>
+        </a:xfrm>
+      </p:grpSpPr>
+      <p:sp>
+        <p:nvSpPr>
+          <p:cNvPr id="5" name="Título 4">
+            <a:extLst>
+              <a:ext uri="{FF2B5EF4-FFF2-40B4-BE49-F238E27FC236}">
+                <a16:creationId xmlns:a16="http://schemas.microsoft.com/office/drawing/2014/main" id="{DB4B6436-9239-4D4C-A703-2406DACAD073}"/>
+              </a:ext>
+            </a:extLst>
+          </p:cNvPr>
+          <p:cNvSpPr>
+            <a:spLocks noGrp="1"/>
+          </p:cNvSpPr>
+          <p:nvPr>
+            <p:ph type="title"/>
+          </p:nvPr>
+        </p:nvSpPr>
+        <p:spPr/>
+        <p:txBody>
+          <a:bodyPr/>
+          <a:lstStyle/>
+          <a:p>
+            <a:r>
+              <a:rPr lang="pt-BR" dirty="0"/>
+              <a:t>Input / Output</a:t>
+            </a:r>
+            <a:endParaRPr lang="en-US" dirty="0"/>
+          </a:p>
+        </p:txBody>
+      </p:sp>
+      <p:sp>
+        <p:nvSpPr>
+          <p:cNvPr id="6" name="Espaço Reservado para Conteúdo 5">
+            <a:extLst>
+              <a:ext uri="{FF2B5EF4-FFF2-40B4-BE49-F238E27FC236}">
+                <a16:creationId xmlns:a16="http://schemas.microsoft.com/office/drawing/2014/main" id="{557CB73A-1938-4F2B-BF26-5474643C5913}"/>
+              </a:ext>
+            </a:extLst>
+          </p:cNvPr>
+          <p:cNvSpPr>
+            <a:spLocks noGrp="1"/>
+          </p:cNvSpPr>
+          <p:nvPr>
+            <p:ph idx="1"/>
+          </p:nvPr>
+        </p:nvSpPr>
+        <p:spPr>
+          <a:xfrm>
+            <a:off x="5626358" y="1504950"/>
+            <a:ext cx="5727441" cy="4672013"/>
+          </a:xfrm>
+        </p:spPr>
+        <p:txBody>
+          <a:bodyPr/>
+          <a:lstStyle/>
+          <a:p>
+            <a:r>
+              <a:rPr lang="pt-BR" dirty="0"/>
+              <a:t>Kinect2grabber</a:t>
+            </a:r>
+          </a:p>
+          <a:p>
+            <a:r>
+              <a:rPr lang="pt-BR" dirty="0"/>
+              <a:t>Live </a:t>
+            </a:r>
+            <a:r>
+              <a:rPr lang="pt-BR" dirty="0" err="1"/>
+              <a:t>Scan</a:t>
+            </a:r>
+            <a:r>
+              <a:rPr lang="pt-BR" dirty="0"/>
+              <a:t> </a:t>
+            </a:r>
+            <a:r>
+              <a:rPr lang="pt-BR" dirty="0" err="1"/>
+              <a:t>on</a:t>
+            </a:r>
+            <a:r>
+              <a:rPr lang="pt-BR" dirty="0"/>
+              <a:t> PCL </a:t>
+            </a:r>
+            <a:r>
+              <a:rPr lang="pt-BR" dirty="0" err="1"/>
+              <a:t>Visualizer</a:t>
+            </a:r>
+            <a:r>
+              <a:rPr lang="pt-BR" dirty="0"/>
+              <a:t> </a:t>
+            </a:r>
+            <a:r>
+              <a:rPr lang="pt-BR" dirty="0" err="1"/>
+              <a:t>Widget</a:t>
+            </a:r>
+            <a:endParaRPr lang="pt-BR" dirty="0"/>
+          </a:p>
+          <a:p>
+            <a:r>
+              <a:rPr lang="pt-BR" dirty="0"/>
+              <a:t>Point </a:t>
+            </a:r>
+            <a:r>
+              <a:rPr lang="pt-BR" dirty="0" err="1"/>
+              <a:t>cloud</a:t>
+            </a:r>
+            <a:r>
+              <a:rPr lang="pt-BR" dirty="0"/>
+              <a:t> display </a:t>
+            </a:r>
+            <a:r>
+              <a:rPr lang="pt-BR" dirty="0" err="1"/>
+              <a:t>on</a:t>
+            </a:r>
+            <a:r>
+              <a:rPr lang="pt-BR" dirty="0"/>
+              <a:t> VTK </a:t>
+            </a:r>
+            <a:r>
+              <a:rPr lang="pt-BR" dirty="0" err="1"/>
+              <a:t>Widget</a:t>
+            </a:r>
+            <a:endParaRPr lang="en-US" dirty="0"/>
+          </a:p>
+        </p:txBody>
+      </p:sp>
+      <p:pic>
+        <p:nvPicPr>
+          <p:cNvPr id="8" name="Imagem 7" descr="Uma imagem contendo captura de tela&#10;&#10;Descrição gerada com muito alta confiança">
+            <a:extLst>
+              <a:ext uri="{FF2B5EF4-FFF2-40B4-BE49-F238E27FC236}">
+                <a16:creationId xmlns:a16="http://schemas.microsoft.com/office/drawing/2014/main" id="{FCA44CEA-72DA-4FB7-B97A-0C6B595297DB}"/>
+              </a:ext>
+            </a:extLst>
+          </p:cNvPr>
+          <p:cNvPicPr>
+            <a:picLocks noChangeAspect="1"/>
+          </p:cNvPicPr>
+          <p:nvPr/>
+        </p:nvPicPr>
+        <p:blipFill rotWithShape="1">
+          <a:blip r:embed="rId2">
+            <a:extLst>
+              <a:ext uri="{28A0092B-C50C-407E-A947-70E740481C1C}">
+                <a14:useLocalDpi xmlns:a14="http://schemas.microsoft.com/office/drawing/2010/main" val="0"/>
+              </a:ext>
+            </a:extLst>
+          </a:blip>
+          <a:srcRect l="34933" t="12065" r="3594" b="20875"/>
+          <a:stretch/>
+        </p:blipFill>
+        <p:spPr>
+          <a:xfrm>
+            <a:off x="6881857" y="3307693"/>
+            <a:ext cx="3216442" cy="2869270"/>
+          </a:xfrm>
+          <a:prstGeom prst="rect">
+            <a:avLst/>
+          </a:prstGeom>
+        </p:spPr>
+      </p:pic>
+      <p:pic>
+        <p:nvPicPr>
+          <p:cNvPr id="10" name="Imagem 9" descr="Uma imagem contendo captura de tela&#10;&#10;Descrição gerada com alta confiança">
+            <a:extLst>
+              <a:ext uri="{FF2B5EF4-FFF2-40B4-BE49-F238E27FC236}">
+                <a16:creationId xmlns:a16="http://schemas.microsoft.com/office/drawing/2014/main" id="{87E6304A-B1E5-4866-B82C-EA95BCCAD583}"/>
+              </a:ext>
+            </a:extLst>
+          </p:cNvPr>
+          <p:cNvPicPr>
+            <a:picLocks noChangeAspect="1"/>
+          </p:cNvPicPr>
+          <p:nvPr/>
+        </p:nvPicPr>
+        <p:blipFill>
+          <a:blip r:embed="rId3">
+            <a:extLst>
+              <a:ext uri="{28A0092B-C50C-407E-A947-70E740481C1C}">
+                <a14:useLocalDpi xmlns:a14="http://schemas.microsoft.com/office/drawing/2010/main" val="0"/>
+              </a:ext>
+            </a:extLst>
+          </a:blip>
+          <a:stretch>
+            <a:fillRect/>
+          </a:stretch>
+        </p:blipFill>
+        <p:spPr>
+          <a:xfrm>
+            <a:off x="305613" y="1948366"/>
+            <a:ext cx="5096527" cy="2961268"/>
+          </a:xfrm>
+          <a:prstGeom prst="rect">
+            <a:avLst/>
+          </a:prstGeom>
+        </p:spPr>
+      </p:pic>
+    </p:spTree>
+    <p:extLst>
+      <p:ext uri="{BB962C8B-B14F-4D97-AF65-F5344CB8AC3E}">
+        <p14:creationId xmlns:p14="http://schemas.microsoft.com/office/powerpoint/2010/main" val="1802754917"/>
+      </p:ext>
+    </p:extLst>
+  </p:cSld>
+  <p:clrMapOvr>
+    <a:masterClrMapping/>
+  </p:clrMapOvr>
+</p:sld>
+</file>
+
+<file path=ppt/slides/slide12.xml><?xml version="1.0" encoding="utf-8"?>
+<p:sld xmlns:a="http://schemas.openxmlformats.org/drawingml/2006/main" xmlns:r="http://schemas.openxmlformats.org/officeDocument/2006/relationships" xmlns:p="http://schemas.openxmlformats.org/presentationml/2006/main">
+  <p:cSld>
+    <p:spTree>
+      <p:nvGrpSpPr>
+        <p:cNvPr id="1" name=""/>
+        <p:cNvGrpSpPr/>
+        <p:nvPr/>
+      </p:nvGrpSpPr>
+      <p:grpSpPr>
+        <a:xfrm>
+          <a:off x="0" y="0"/>
+          <a:ext cx="0" cy="0"/>
+          <a:chOff x="0" y="0"/>
+          <a:chExt cx="0" cy="0"/>
+        </a:xfrm>
+      </p:grpSpPr>
+      <p:sp>
+        <p:nvSpPr>
+          <p:cNvPr id="2" name="Title 1"/>
+          <p:cNvSpPr>
+            <a:spLocks noGrp="1"/>
+          </p:cNvSpPr>
+          <p:nvPr>
+            <p:ph type="title"/>
+          </p:nvPr>
+        </p:nvSpPr>
+        <p:spPr/>
+        <p:txBody>
+          <a:bodyPr/>
+          <a:lstStyle/>
+          <a:p>
+            <a:r>
+              <a:rPr lang="en-US" dirty="0"/>
+              <a:t>GUI</a:t>
+            </a:r>
+          </a:p>
+        </p:txBody>
+      </p:sp>
+      <p:sp>
+        <p:nvSpPr>
+          <p:cNvPr id="3" name="Content Placeholder 2"/>
+          <p:cNvSpPr>
+            <a:spLocks noGrp="1"/>
+          </p:cNvSpPr>
+          <p:nvPr>
+            <p:ph idx="1"/>
+          </p:nvPr>
+        </p:nvSpPr>
+        <p:spPr/>
+        <p:txBody>
+          <a:bodyPr/>
+          <a:lstStyle/>
+          <a:p>
+            <a:r>
+              <a:rPr lang="en-US" dirty="0"/>
+              <a:t>Simplicity</a:t>
+            </a:r>
+          </a:p>
+          <a:p>
+            <a:r>
+              <a:rPr lang="en-US" dirty="0"/>
+              <a:t>Power</a:t>
+            </a:r>
+          </a:p>
+          <a:p>
+            <a:r>
+              <a:rPr lang="en-US" dirty="0"/>
+              <a:t>Diversity</a:t>
+            </a:r>
+          </a:p>
+          <a:p>
+            <a:r>
+              <a:rPr lang="en-US" dirty="0"/>
+              <a:t>Organization</a:t>
+            </a:r>
+          </a:p>
+          <a:p>
+            <a:pPr lvl="2"/>
+            <a:r>
+              <a:rPr lang="en-US" dirty="0"/>
+              <a:t>Main window</a:t>
+            </a:r>
+          </a:p>
+          <a:p>
+            <a:pPr lvl="2"/>
+            <a:r>
+              <a:rPr lang="en-US" dirty="0"/>
+              <a:t>Scan window</a:t>
+            </a:r>
+          </a:p>
+          <a:p>
+            <a:pPr lvl="2"/>
+            <a:r>
+              <a:rPr lang="en-US" dirty="0"/>
+              <a:t>Filter window</a:t>
+            </a:r>
+          </a:p>
+          <a:p>
+            <a:pPr lvl="2"/>
+            <a:r>
+              <a:rPr lang="en-US" dirty="0"/>
+              <a:t>Register window</a:t>
+            </a:r>
+          </a:p>
+          <a:p>
+            <a:endParaRPr lang="en-US" dirty="0"/>
+          </a:p>
+        </p:txBody>
+      </p:sp>
+    </p:spTree>
+    <p:extLst>
+      <p:ext uri="{BB962C8B-B14F-4D97-AF65-F5344CB8AC3E}">
+        <p14:creationId xmlns:p14="http://schemas.microsoft.com/office/powerpoint/2010/main" val="2923495858"/>
+      </p:ext>
+    </p:extLst>
+  </p:cSld>
+  <p:clrMapOvr>
+    <a:masterClrMapping/>
+  </p:clrMapOvr>
+</p:sld>
+</file>
+
+<file path=ppt/slides/slide13.xml><?xml version="1.0" encoding="utf-8"?>
+<p:sld xmlns:a="http://schemas.openxmlformats.org/drawingml/2006/main" xmlns:r="http://schemas.openxmlformats.org/officeDocument/2006/relationships" xmlns:p="http://schemas.openxmlformats.org/presentationml/2006/main">
+  <p:cSld>
+    <p:spTree>
+      <p:nvGrpSpPr>
+        <p:cNvPr id="1" name=""/>
+        <p:cNvGrpSpPr/>
+        <p:nvPr/>
+      </p:nvGrpSpPr>
+      <p:grpSpPr>
+        <a:xfrm>
+          <a:off x="0" y="0"/>
+          <a:ext cx="0" cy="0"/>
+          <a:chOff x="0" y="0"/>
+          <a:chExt cx="0" cy="0"/>
+        </a:xfrm>
+      </p:grpSpPr>
+      <p:sp>
+        <p:nvSpPr>
+          <p:cNvPr id="2" name="Title 1"/>
+          <p:cNvSpPr>
+            <a:spLocks noGrp="1"/>
+          </p:cNvSpPr>
+          <p:nvPr>
+            <p:ph type="title"/>
+          </p:nvPr>
+        </p:nvSpPr>
+        <p:spPr/>
+        <p:txBody>
+          <a:bodyPr/>
+          <a:lstStyle/>
+          <a:p>
+            <a:r>
+              <a:rPr lang="en-US" dirty="0"/>
+              <a:t>GUI – Main window</a:t>
+            </a:r>
+          </a:p>
+        </p:txBody>
+      </p:sp>
+      <p:pic>
+        <p:nvPicPr>
+          <p:cNvPr id="4" name="Picture 2" descr="C:\Users\Mladen\Downloads\Windows_-_MAGMA_Project\main_window.JPG"/>
+          <p:cNvPicPr>
+            <a:picLocks noGrp="1" noChangeAspect="1" noChangeArrowheads="1"/>
+          </p:cNvPicPr>
+          <p:nvPr>
+            <p:ph idx="1"/>
+          </p:nvPr>
+        </p:nvPicPr>
+        <p:blipFill>
+          <a:blip r:embed="rId2"/>
+          <a:srcRect/>
+          <a:stretch>
+            <a:fillRect/>
+          </a:stretch>
+        </p:blipFill>
+        <p:spPr bwMode="auto">
+          <a:xfrm>
+            <a:off x="3321611" y="1600201"/>
+            <a:ext cx="5548779" cy="4525963"/>
+          </a:xfrm>
+          <a:prstGeom prst="rect">
+            <a:avLst/>
+          </a:prstGeom>
+          <a:noFill/>
+        </p:spPr>
+      </p:pic>
+    </p:spTree>
+    <p:extLst>
+      <p:ext uri="{BB962C8B-B14F-4D97-AF65-F5344CB8AC3E}">
+        <p14:creationId xmlns:p14="http://schemas.microsoft.com/office/powerpoint/2010/main" val="2665487860"/>
+      </p:ext>
+    </p:extLst>
+  </p:cSld>
+  <p:clrMapOvr>
+    <a:masterClrMapping/>
+  </p:clrMapOvr>
+</p:sld>
+</file>
+
+<file path=ppt/slides/slide14.xml><?xml version="1.0" encoding="utf-8"?>
+<p:sld xmlns:a="http://schemas.openxmlformats.org/drawingml/2006/main" xmlns:r="http://schemas.openxmlformats.org/officeDocument/2006/relationships" xmlns:p="http://schemas.openxmlformats.org/presentationml/2006/main">
+  <p:cSld>
+    <p:spTree>
+      <p:nvGrpSpPr>
+        <p:cNvPr id="1" name=""/>
+        <p:cNvGrpSpPr/>
+        <p:nvPr/>
+      </p:nvGrpSpPr>
+      <p:grpSpPr>
+        <a:xfrm>
+          <a:off x="0" y="0"/>
+          <a:ext cx="0" cy="0"/>
+          <a:chOff x="0" y="0"/>
+          <a:chExt cx="0" cy="0"/>
+        </a:xfrm>
+      </p:grpSpPr>
+      <p:sp>
+        <p:nvSpPr>
+          <p:cNvPr id="2" name="Title 1"/>
+          <p:cNvSpPr>
+            <a:spLocks noGrp="1"/>
+          </p:cNvSpPr>
+          <p:nvPr>
+            <p:ph type="title"/>
+          </p:nvPr>
+        </p:nvSpPr>
+        <p:spPr/>
+        <p:txBody>
+          <a:bodyPr/>
+          <a:lstStyle/>
+          <a:p>
+            <a:r>
+              <a:rPr lang="en-US" dirty="0"/>
+              <a:t>GUI – Filtering window</a:t>
+            </a:r>
+          </a:p>
+        </p:txBody>
+      </p:sp>
+      <p:pic>
+        <p:nvPicPr>
+          <p:cNvPr id="3075" name="Picture 3" descr="C:\Users\Mladen\Downloads\Windows_-_MAGMA_Project\filter_window.JPG"/>
+          <p:cNvPicPr>
+            <a:picLocks noGrp="1" noChangeAspect="1" noChangeArrowheads="1"/>
+          </p:cNvPicPr>
+          <p:nvPr>
+            <p:ph idx="1"/>
+          </p:nvPr>
+        </p:nvPicPr>
+        <p:blipFill>
+          <a:blip r:embed="rId2"/>
+          <a:srcRect/>
+          <a:stretch>
+            <a:fillRect/>
+          </a:stretch>
+        </p:blipFill>
+        <p:spPr bwMode="auto">
+          <a:xfrm>
+            <a:off x="2673358" y="1600201"/>
+            <a:ext cx="6845284" cy="4525963"/>
+          </a:xfrm>
+          <a:prstGeom prst="rect">
+            <a:avLst/>
+          </a:prstGeom>
+          <a:noFill/>
+        </p:spPr>
+      </p:pic>
+    </p:spTree>
+    <p:extLst>
+      <p:ext uri="{BB962C8B-B14F-4D97-AF65-F5344CB8AC3E}">
+        <p14:creationId xmlns:p14="http://schemas.microsoft.com/office/powerpoint/2010/main" val="605894374"/>
+      </p:ext>
+    </p:extLst>
+  </p:cSld>
+  <p:clrMapOvr>
+    <a:masterClrMapping/>
+  </p:clrMapOvr>
+</p:sld>
+</file>
+
+<file path=ppt/slides/slide15.xml><?xml version="1.0" encoding="utf-8"?>
+<p:sld xmlns:a="http://schemas.openxmlformats.org/drawingml/2006/main" xmlns:r="http://schemas.openxmlformats.org/officeDocument/2006/relationships" xmlns:p="http://schemas.openxmlformats.org/presentationml/2006/main">
+  <p:cSld>
+    <p:spTree>
+      <p:nvGrpSpPr>
+        <p:cNvPr id="1" name=""/>
+        <p:cNvGrpSpPr/>
+        <p:nvPr/>
+      </p:nvGrpSpPr>
+      <p:grpSpPr>
+        <a:xfrm>
+          <a:off x="0" y="0"/>
+          <a:ext cx="0" cy="0"/>
+          <a:chOff x="0" y="0"/>
+          <a:chExt cx="0" cy="0"/>
+        </a:xfrm>
+      </p:grpSpPr>
+      <p:sp>
+        <p:nvSpPr>
           <p:cNvPr id="2" name="Title 1"/>
           <p:cNvSpPr>
             <a:spLocks noGrp="1"/>
@@ -4000,7 +4715,7 @@
 </p:sld>
 </file>
 
-<file path=ppt/slides/slide11.xml><?xml version="1.0" encoding="utf-8"?>
+<file path=ppt/slides/slide16.xml><?xml version="1.0" encoding="utf-8"?>
 <p:sld xmlns:a="http://schemas.openxmlformats.org/drawingml/2006/main" xmlns:r="http://schemas.openxmlformats.org/officeDocument/2006/relationships" xmlns:p="http://schemas.openxmlformats.org/presentationml/2006/main">
   <p:cSld>
     <p:spTree>
@@ -4162,24 +4877,12 @@
           </a:p>
           <a:p>
             <a:r>
-              <a:rPr lang="pt-BR" dirty="0" err="1"/>
-              <a:t>Full</a:t>
-            </a:r>
-            <a:r>
               <a:rPr lang="pt-BR" dirty="0"/>
-              <a:t> </a:t>
-            </a:r>
-            <a:r>
-              <a:rPr lang="pt-BR" dirty="0" err="1"/>
-              <a:t>screen</a:t>
-            </a:r>
-            <a:r>
-              <a:rPr lang="pt-BR" dirty="0"/>
-              <a:t> </a:t>
-            </a:r>
-            <a:r>
-              <a:rPr lang="pt-BR" dirty="0" err="1"/>
-              <a:t>logger</a:t>
+              <a:t>Full screen </a:t>
+            </a:r>
+            <a:r>
+              <a:rPr lang="tr-TR" dirty="0"/>
+              <a:t>application</a:t>
             </a:r>
             <a:endParaRPr lang="pt-BR" dirty="0"/>
           </a:p>
@@ -4242,7 +4945,7 @@
 </p:sld>
 </file>
 
-<file path=ppt/slides/slide12.xml><?xml version="1.0" encoding="utf-8"?>
+<file path=ppt/slides/slide17.xml><?xml version="1.0" encoding="utf-8"?>
 <p:sld xmlns:a="http://schemas.openxmlformats.org/drawingml/2006/main" xmlns:r="http://schemas.openxmlformats.org/officeDocument/2006/relationships" xmlns:p="http://schemas.openxmlformats.org/presentationml/2006/main">
   <p:cSld>
     <p:spTree>
@@ -4436,7 +5139,7 @@
 </p:sld>
 </file>
 
-<file path=ppt/slides/slide13.xml><?xml version="1.0" encoding="utf-8"?>
+<file path=ppt/slides/slide18.xml><?xml version="1.0" encoding="utf-8"?>
 <p:sld xmlns:a="http://schemas.openxmlformats.org/drawingml/2006/main" xmlns:r="http://schemas.openxmlformats.org/officeDocument/2006/relationships" xmlns:p="http://schemas.openxmlformats.org/presentationml/2006/main">
   <p:cSld>
     <p:spTree>
@@ -4500,6 +5203,141 @@
     <p:extLst>
       <p:ext uri="{BB962C8B-B14F-4D97-AF65-F5344CB8AC3E}">
         <p14:creationId xmlns:p14="http://schemas.microsoft.com/office/powerpoint/2010/main" val="3998744856"/>
+      </p:ext>
+    </p:extLst>
+  </p:cSld>
+  <p:clrMapOvr>
+    <a:masterClrMapping/>
+  </p:clrMapOvr>
+</p:sld>
+</file>
+
+<file path=ppt/slides/slide19.xml><?xml version="1.0" encoding="utf-8"?>
+<p:sld xmlns:a="http://schemas.openxmlformats.org/drawingml/2006/main" xmlns:r="http://schemas.openxmlformats.org/officeDocument/2006/relationships" xmlns:p="http://schemas.openxmlformats.org/presentationml/2006/main">
+  <p:cSld>
+    <p:spTree>
+      <p:nvGrpSpPr>
+        <p:cNvPr id="1" name=""/>
+        <p:cNvGrpSpPr/>
+        <p:nvPr/>
+      </p:nvGrpSpPr>
+      <p:grpSpPr>
+        <a:xfrm>
+          <a:off x="0" y="0"/>
+          <a:ext cx="0" cy="0"/>
+          <a:chOff x="0" y="0"/>
+          <a:chExt cx="0" cy="0"/>
+        </a:xfrm>
+      </p:grpSpPr>
+      <p:pic>
+        <p:nvPicPr>
+          <p:cNvPr id="5" name="Picture 4">
+            <a:extLst>
+              <a:ext uri="{FF2B5EF4-FFF2-40B4-BE49-F238E27FC236}">
+                <a16:creationId xmlns:a16="http://schemas.microsoft.com/office/drawing/2014/main" id="{339A186D-9878-4F9C-81A1-5774597C71C0}"/>
+              </a:ext>
+            </a:extLst>
+          </p:cNvPr>
+          <p:cNvPicPr>
+            <a:picLocks noChangeAspect="1"/>
+          </p:cNvPicPr>
+          <p:nvPr/>
+        </p:nvPicPr>
+        <p:blipFill>
+          <a:blip r:embed="rId2">
+            <a:extLst>
+              <a:ext uri="{28A0092B-C50C-407E-A947-70E740481C1C}">
+                <a14:useLocalDpi xmlns:a14="http://schemas.microsoft.com/office/drawing/2010/main" val="0"/>
+              </a:ext>
+            </a:extLst>
+          </a:blip>
+          <a:stretch>
+            <a:fillRect/>
+          </a:stretch>
+        </p:blipFill>
+        <p:spPr>
+          <a:xfrm>
+            <a:off x="0" y="2631233"/>
+            <a:ext cx="12192000" cy="4226767"/>
+          </a:xfrm>
+          <a:prstGeom prst="rect">
+            <a:avLst/>
+          </a:prstGeom>
+        </p:spPr>
+      </p:pic>
+      <p:sp>
+        <p:nvSpPr>
+          <p:cNvPr id="2" name="Título 1">
+            <a:extLst>
+              <a:ext uri="{FF2B5EF4-FFF2-40B4-BE49-F238E27FC236}">
+                <a16:creationId xmlns:a16="http://schemas.microsoft.com/office/drawing/2014/main" id="{A48190DC-C2E4-4A5A-88BE-5F122742EDF3}"/>
+              </a:ext>
+            </a:extLst>
+          </p:cNvPr>
+          <p:cNvSpPr>
+            <a:spLocks noGrp="1"/>
+          </p:cNvSpPr>
+          <p:nvPr>
+            <p:ph type="title"/>
+          </p:nvPr>
+        </p:nvSpPr>
+        <p:spPr/>
+        <p:txBody>
+          <a:bodyPr/>
+          <a:lstStyle/>
+          <a:p>
+            <a:r>
+              <a:rPr lang="tr-TR" dirty="0"/>
+              <a:t>Q &amp; A … and some Stats</a:t>
+            </a:r>
+            <a:endParaRPr lang="en-US" dirty="0"/>
+          </a:p>
+        </p:txBody>
+      </p:sp>
+      <p:sp>
+        <p:nvSpPr>
+          <p:cNvPr id="3" name="Espaço Reservado para Conteúdo 2">
+            <a:extLst>
+              <a:ext uri="{FF2B5EF4-FFF2-40B4-BE49-F238E27FC236}">
+                <a16:creationId xmlns:a16="http://schemas.microsoft.com/office/drawing/2014/main" id="{A3528BCA-9E75-49E5-A2C7-4AB1D4D5FD79}"/>
+              </a:ext>
+            </a:extLst>
+          </p:cNvPr>
+          <p:cNvSpPr>
+            <a:spLocks noGrp="1"/>
+          </p:cNvSpPr>
+          <p:nvPr>
+            <p:ph idx="1"/>
+          </p:nvPr>
+        </p:nvSpPr>
+        <p:spPr/>
+        <p:txBody>
+          <a:bodyPr/>
+          <a:lstStyle/>
+          <a:p>
+            <a:r>
+              <a:rPr lang="tr-TR" dirty="0"/>
+              <a:t>Log files created in the last 2 days: 700</a:t>
+            </a:r>
+          </a:p>
+          <a:p>
+            <a:r>
+              <a:rPr lang="tr-TR" dirty="0"/>
+              <a:t>Commits: 165</a:t>
+            </a:r>
+          </a:p>
+          <a:p>
+            <a:r>
+              <a:rPr lang="tr-TR" dirty="0"/>
+              <a:t>Lines of code: 3748</a:t>
+            </a:r>
+          </a:p>
+        </p:txBody>
+      </p:sp>
+    </p:spTree>
+    <p:extLst>
+      <p:ext uri="{BB962C8B-B14F-4D97-AF65-F5344CB8AC3E}">
+        <p14:creationId xmlns:p14="http://schemas.microsoft.com/office/powerpoint/2010/main" val="2243037479"/>
       </p:ext>
     </p:extLst>
   </p:cSld>
@@ -4870,13 +5708,7 @@
       </p:grpSpPr>
       <p:sp>
         <p:nvSpPr>
-          <p:cNvPr id="2" name="Título 1">
-            <a:extLst>
-              <a:ext uri="{FF2B5EF4-FFF2-40B4-BE49-F238E27FC236}">
-                <a16:creationId xmlns:a16="http://schemas.microsoft.com/office/drawing/2014/main" id="{2903DB59-31D9-40AC-9D02-9E05E2690438}"/>
-              </a:ext>
-            </a:extLst>
-          </p:cNvPr>
+          <p:cNvPr id="2" name="Title 1"/>
           <p:cNvSpPr>
             <a:spLocks noGrp="1"/>
           </p:cNvSpPr>
@@ -4890,159 +5722,89 @@
           <a:lstStyle/>
           <a:p>
             <a:r>
-              <a:rPr lang="pt-BR" dirty="0" err="1"/>
-              <a:t>Logger</a:t>
+              <a:rPr lang="tr-TR" dirty="0"/>
+              <a:t>Project management</a:t>
             </a:r>
             <a:endParaRPr lang="en-US" dirty="0"/>
           </a:p>
         </p:txBody>
       </p:sp>
-      <p:pic>
-        <p:nvPicPr>
-          <p:cNvPr id="6" name="Espaço Reservado para Conteúdo 5" descr="Uma imagem contendo captura de tela&#10;&#10;Descrição gerada com muito alta confiança">
-            <a:extLst>
-              <a:ext uri="{FF2B5EF4-FFF2-40B4-BE49-F238E27FC236}">
-                <a16:creationId xmlns:a16="http://schemas.microsoft.com/office/drawing/2014/main" id="{42271960-5DC9-4474-9D6A-370ACBE93406}"/>
-              </a:ext>
-            </a:extLst>
-          </p:cNvPr>
-          <p:cNvPicPr>
-            <a:picLocks noGrp="1" noChangeAspect="1"/>
-          </p:cNvPicPr>
-          <p:nvPr>
-            <p:ph sz="half" idx="1"/>
-          </p:nvPr>
-        </p:nvPicPr>
-        <p:blipFill>
-          <a:blip r:embed="rId2">
-            <a:extLst>
-              <a:ext uri="{28A0092B-C50C-407E-A947-70E740481C1C}">
-                <a14:useLocalDpi xmlns:a14="http://schemas.microsoft.com/office/drawing/2010/main" val="0"/>
-              </a:ext>
-            </a:extLst>
-          </a:blip>
-          <a:stretch>
-            <a:fillRect/>
-          </a:stretch>
-        </p:blipFill>
-        <p:spPr>
-          <a:xfrm>
-            <a:off x="5066522" y="1653412"/>
-            <a:ext cx="3933825" cy="885825"/>
-          </a:xfrm>
-        </p:spPr>
-      </p:pic>
-      <p:sp>
-        <p:nvSpPr>
-          <p:cNvPr id="7" name="Espaço Reservado para Conteúdo 6">
-            <a:extLst>
-              <a:ext uri="{FF2B5EF4-FFF2-40B4-BE49-F238E27FC236}">
-                <a16:creationId xmlns:a16="http://schemas.microsoft.com/office/drawing/2014/main" id="{846AE223-E159-4B57-96D2-2425165C8458}"/>
-              </a:ext>
-            </a:extLst>
-          </p:cNvPr>
-          <p:cNvSpPr>
-            <a:spLocks noGrp="1"/>
-          </p:cNvSpPr>
-          <p:nvPr>
-            <p:ph sz="half" idx="2"/>
-          </p:nvPr>
-        </p:nvSpPr>
-        <p:spPr>
-          <a:xfrm>
-            <a:off x="5066522" y="2892489"/>
-            <a:ext cx="6287278" cy="3284473"/>
-          </a:xfrm>
-        </p:spPr>
-        <p:txBody>
-          <a:bodyPr/>
-          <a:lstStyle/>
-          <a:p>
-            <a:r>
-              <a:rPr lang="pt-BR" dirty="0"/>
-              <a:t>Debug </a:t>
-            </a:r>
-            <a:r>
-              <a:rPr lang="pt-BR" dirty="0" err="1"/>
-              <a:t>feature</a:t>
-            </a:r>
-            <a:endParaRPr lang="pt-BR" dirty="0"/>
-          </a:p>
-          <a:p>
-            <a:r>
-              <a:rPr lang="pt-BR" dirty="0" err="1"/>
-              <a:t>Singleton</a:t>
-            </a:r>
-            <a:r>
-              <a:rPr lang="pt-BR" dirty="0"/>
-              <a:t> design</a:t>
-            </a:r>
-          </a:p>
-          <a:p>
-            <a:r>
-              <a:rPr lang="pt-BR" dirty="0" err="1"/>
-              <a:t>Signal</a:t>
-            </a:r>
-            <a:r>
-              <a:rPr lang="pt-BR" dirty="0"/>
-              <a:t> / slots</a:t>
-            </a:r>
-          </a:p>
-          <a:p>
-            <a:r>
-              <a:rPr lang="pt-BR" dirty="0" err="1"/>
-              <a:t>Easiness</a:t>
-            </a:r>
-            <a:r>
-              <a:rPr lang="pt-BR" dirty="0"/>
-              <a:t> </a:t>
-            </a:r>
-            <a:r>
-              <a:rPr lang="pt-BR" dirty="0" err="1"/>
-              <a:t>of</a:t>
-            </a:r>
-            <a:r>
-              <a:rPr lang="pt-BR" dirty="0"/>
-              <a:t> use</a:t>
-            </a:r>
+      <p:sp>
+        <p:nvSpPr>
+          <p:cNvPr id="3" name="Content Placeholder 2"/>
+          <p:cNvSpPr>
+            <a:spLocks noGrp="1"/>
+          </p:cNvSpPr>
+          <p:nvPr>
+            <p:ph idx="1"/>
+          </p:nvPr>
+        </p:nvSpPr>
+        <p:spPr/>
+        <p:txBody>
+          <a:bodyPr/>
+          <a:lstStyle/>
+          <a:p>
             <a:endParaRPr lang="en-US" dirty="0"/>
           </a:p>
-        </p:txBody>
-      </p:sp>
-      <p:pic>
-        <p:nvPicPr>
-          <p:cNvPr id="4" name="Imagem 3">
-            <a:extLst>
-              <a:ext uri="{FF2B5EF4-FFF2-40B4-BE49-F238E27FC236}">
-                <a16:creationId xmlns:a16="http://schemas.microsoft.com/office/drawing/2014/main" id="{16B277ED-18EF-40AD-B880-2CA021A80B43}"/>
-              </a:ext>
-            </a:extLst>
-          </p:cNvPr>
-          <p:cNvPicPr>
-            <a:picLocks noChangeAspect="1"/>
-          </p:cNvPicPr>
-          <p:nvPr/>
-        </p:nvPicPr>
-        <p:blipFill>
-          <a:blip r:embed="rId3"/>
-          <a:stretch>
-            <a:fillRect/>
-          </a:stretch>
-        </p:blipFill>
-        <p:spPr>
-          <a:xfrm>
-            <a:off x="1929878" y="1761687"/>
-            <a:ext cx="1685925" cy="3971925"/>
-          </a:xfrm>
-          <a:prstGeom prst="rect">
-            <a:avLst/>
-          </a:prstGeom>
-        </p:spPr>
-      </p:pic>
+          <a:p>
+            <a:r>
+              <a:rPr lang="tr-TR" dirty="0"/>
+              <a:t>Weekly meeting</a:t>
+            </a:r>
+          </a:p>
+          <a:p>
+            <a:r>
+              <a:rPr lang="tr-TR" dirty="0"/>
+              <a:t>Tasks splitting:</a:t>
+            </a:r>
+          </a:p>
+          <a:p>
+            <a:pPr lvl="1"/>
+            <a:r>
+              <a:rPr lang="tr-TR" dirty="0"/>
+              <a:t>Sensor</a:t>
+            </a:r>
+          </a:p>
+          <a:p>
+            <a:pPr lvl="1"/>
+            <a:r>
+              <a:rPr lang="tr-TR" dirty="0"/>
+              <a:t>GUI</a:t>
+            </a:r>
+          </a:p>
+          <a:p>
+            <a:pPr lvl="1"/>
+            <a:r>
+              <a:rPr lang="tr-TR" dirty="0"/>
+              <a:t>Mahematics</a:t>
+            </a:r>
+          </a:p>
+          <a:p>
+            <a:pPr lvl="1"/>
+            <a:r>
+              <a:rPr lang="tr-TR" dirty="0"/>
+              <a:t>Software Design &amp; team leading</a:t>
+            </a:r>
+          </a:p>
+          <a:p>
+            <a:r>
+              <a:rPr lang="tr-TR" dirty="0"/>
+              <a:t>Collaborative tools</a:t>
+            </a:r>
+          </a:p>
+          <a:p>
+            <a:pPr lvl="1"/>
+            <a:endParaRPr lang="tr-TR" dirty="0"/>
+          </a:p>
+          <a:p>
+            <a:endParaRPr lang="en-US" dirty="0"/>
+          </a:p>
+        </p:txBody>
+      </p:sp>
     </p:spTree>
     <p:extLst>
       <p:ext uri="{BB962C8B-B14F-4D97-AF65-F5344CB8AC3E}">
-        <p14:creationId xmlns:p14="http://schemas.microsoft.com/office/powerpoint/2010/main" val="82065633"/>
+        <p14:creationId xmlns:p14="http://schemas.microsoft.com/office/powerpoint/2010/main" val="2196782340"/>
       </p:ext>
     </p:extLst>
   </p:cSld>
@@ -5071,13 +5833,7 @@
       </p:grpSpPr>
       <p:sp>
         <p:nvSpPr>
-          <p:cNvPr id="5" name="Título 4">
-            <a:extLst>
-              <a:ext uri="{FF2B5EF4-FFF2-40B4-BE49-F238E27FC236}">
-                <a16:creationId xmlns:a16="http://schemas.microsoft.com/office/drawing/2014/main" id="{DB4B6436-9239-4D4C-A703-2406DACAD073}"/>
-              </a:ext>
-            </a:extLst>
-          </p:cNvPr>
+          <p:cNvPr id="2" name="Title 1"/>
           <p:cNvSpPr>
             <a:spLocks noGrp="1"/>
           </p:cNvSpPr>
@@ -5091,8 +5847,8 @@
           <a:lstStyle/>
           <a:p>
             <a:r>
-              <a:rPr lang="pt-BR" dirty="0"/>
-              <a:t>Input / Output</a:t>
+              <a:rPr lang="tr-TR" dirty="0"/>
+              <a:t>Software design</a:t>
             </a:r>
             <a:endParaRPr lang="en-US" dirty="0"/>
           </a:p>
@@ -5100,13 +5856,7 @@
       </p:sp>
       <p:sp>
         <p:nvSpPr>
-          <p:cNvPr id="6" name="Espaço Reservado para Conteúdo 5">
-            <a:extLst>
-              <a:ext uri="{FF2B5EF4-FFF2-40B4-BE49-F238E27FC236}">
-                <a16:creationId xmlns:a16="http://schemas.microsoft.com/office/drawing/2014/main" id="{557CB73A-1938-4F2B-BF26-5474643C5913}"/>
-              </a:ext>
-            </a:extLst>
-          </p:cNvPr>
+          <p:cNvPr id="3" name="Content Placeholder 2"/>
           <p:cNvSpPr>
             <a:spLocks noGrp="1"/>
           </p:cNvSpPr>
@@ -5114,160 +5864,65 @@
             <p:ph idx="1"/>
           </p:nvPr>
         </p:nvSpPr>
-        <p:spPr>
-          <a:xfrm>
-            <a:off x="5626358" y="1504950"/>
-            <a:ext cx="5727441" cy="4672013"/>
-          </a:xfrm>
-        </p:spPr>
-        <p:txBody>
-          <a:bodyPr/>
-          <a:lstStyle/>
-          <a:p>
-            <a:r>
-              <a:rPr lang="pt-BR" dirty="0"/>
-              <a:t>Kinect2grabber</a:t>
-            </a:r>
-          </a:p>
-          <a:p>
-            <a:r>
-              <a:rPr lang="pt-BR" dirty="0"/>
-              <a:t>Live </a:t>
-            </a:r>
-            <a:r>
-              <a:rPr lang="pt-BR" dirty="0" err="1"/>
-              <a:t>Scan</a:t>
-            </a:r>
-            <a:r>
-              <a:rPr lang="pt-BR" dirty="0"/>
-              <a:t> </a:t>
-            </a:r>
-            <a:r>
-              <a:rPr lang="pt-BR" dirty="0" err="1"/>
-              <a:t>on</a:t>
-            </a:r>
-            <a:r>
-              <a:rPr lang="pt-BR" dirty="0"/>
-              <a:t> PCL </a:t>
-            </a:r>
-            <a:r>
-              <a:rPr lang="pt-BR" dirty="0" err="1"/>
-              <a:t>Visualizer</a:t>
-            </a:r>
-            <a:r>
-              <a:rPr lang="pt-BR" dirty="0"/>
-              <a:t> </a:t>
-            </a:r>
-            <a:r>
-              <a:rPr lang="pt-BR" dirty="0" err="1"/>
-              <a:t>Widget</a:t>
-            </a:r>
-            <a:endParaRPr lang="pt-BR" dirty="0"/>
-          </a:p>
-          <a:p>
-            <a:r>
-              <a:rPr lang="pt-BR" dirty="0"/>
-              <a:t>Point </a:t>
-            </a:r>
-            <a:r>
-              <a:rPr lang="pt-BR" dirty="0" err="1"/>
-              <a:t>cloud</a:t>
-            </a:r>
-            <a:r>
-              <a:rPr lang="pt-BR" dirty="0"/>
-              <a:t> display </a:t>
-            </a:r>
-            <a:r>
-              <a:rPr lang="pt-BR" dirty="0" err="1"/>
-              <a:t>on</a:t>
-            </a:r>
-            <a:r>
-              <a:rPr lang="pt-BR" dirty="0"/>
-              <a:t> VTK </a:t>
-            </a:r>
-            <a:r>
-              <a:rPr lang="pt-BR" dirty="0" err="1"/>
-              <a:t>Widget</a:t>
-            </a:r>
+        <p:spPr/>
+        <p:txBody>
+          <a:bodyPr/>
+          <a:lstStyle/>
+          <a:p>
             <a:endParaRPr lang="en-US" dirty="0"/>
           </a:p>
-        </p:txBody>
-      </p:sp>
-      <p:pic>
-        <p:nvPicPr>
-          <p:cNvPr id="8" name="Imagem 7" descr="Uma imagem contendo captura de tela&#10;&#10;Descrição gerada com muito alta confiança">
-            <a:extLst>
-              <a:ext uri="{FF2B5EF4-FFF2-40B4-BE49-F238E27FC236}">
-                <a16:creationId xmlns:a16="http://schemas.microsoft.com/office/drawing/2014/main" id="{FCA44CEA-72DA-4FB7-B97A-0C6B595297DB}"/>
-              </a:ext>
-            </a:extLst>
-          </p:cNvPr>
-          <p:cNvPicPr>
-            <a:picLocks noChangeAspect="1"/>
-          </p:cNvPicPr>
-          <p:nvPr/>
-        </p:nvPicPr>
-        <p:blipFill rotWithShape="1">
-          <a:blip r:embed="rId2">
-            <a:extLst>
-              <a:ext uri="{28A0092B-C50C-407E-A947-70E740481C1C}">
-                <a14:useLocalDpi xmlns:a14="http://schemas.microsoft.com/office/drawing/2010/main" val="0"/>
-              </a:ext>
-            </a:extLst>
-          </a:blip>
-          <a:srcRect l="34933" t="12065" r="3594" b="20875"/>
-          <a:stretch/>
-        </p:blipFill>
-        <p:spPr>
-          <a:xfrm>
-            <a:off x="6881857" y="3307693"/>
-            <a:ext cx="3216442" cy="2869270"/>
-          </a:xfrm>
-          <a:prstGeom prst="rect">
-            <a:avLst/>
-          </a:prstGeom>
-        </p:spPr>
-      </p:pic>
-      <p:pic>
-        <p:nvPicPr>
-          <p:cNvPr id="10" name="Imagem 9" descr="Uma imagem contendo captura de tela&#10;&#10;Descrição gerada com alta confiança">
-            <a:extLst>
-              <a:ext uri="{FF2B5EF4-FFF2-40B4-BE49-F238E27FC236}">
-                <a16:creationId xmlns:a16="http://schemas.microsoft.com/office/drawing/2014/main" id="{87E6304A-B1E5-4866-B82C-EA95BCCAD583}"/>
-              </a:ext>
-            </a:extLst>
-          </p:cNvPr>
-          <p:cNvPicPr>
-            <a:picLocks noChangeAspect="1"/>
-          </p:cNvPicPr>
-          <p:nvPr/>
-        </p:nvPicPr>
-        <p:blipFill>
-          <a:blip r:embed="rId3">
-            <a:extLst>
-              <a:ext uri="{28A0092B-C50C-407E-A947-70E740481C1C}">
-                <a14:useLocalDpi xmlns:a14="http://schemas.microsoft.com/office/drawing/2010/main" val="0"/>
-              </a:ext>
-            </a:extLst>
-          </a:blip>
-          <a:stretch>
-            <a:fillRect/>
-          </a:stretch>
-        </p:blipFill>
-        <p:spPr>
-          <a:xfrm>
-            <a:off x="305613" y="1948366"/>
-            <a:ext cx="5096527" cy="2961268"/>
-          </a:xfrm>
-          <a:prstGeom prst="rect">
-            <a:avLst/>
-          </a:prstGeom>
-        </p:spPr>
-      </p:pic>
+          <a:p>
+            <a:r>
+              <a:rPr lang="tr-TR" dirty="0"/>
+              <a:t>Code splitted meaningfully</a:t>
+            </a:r>
+          </a:p>
+          <a:p>
+            <a:endParaRPr lang="tr-TR" dirty="0"/>
+          </a:p>
+          <a:p>
+            <a:r>
+              <a:rPr lang="tr-TR" dirty="0"/>
+              <a:t>Use of UML diagrams for:</a:t>
+            </a:r>
+          </a:p>
+          <a:p>
+            <a:pPr lvl="1"/>
+            <a:r>
+              <a:rPr lang="tr-TR" dirty="0"/>
+              <a:t>Understanding</a:t>
+            </a:r>
+          </a:p>
+          <a:p>
+            <a:pPr lvl="1"/>
+            <a:r>
+              <a:rPr lang="tr-TR" dirty="0"/>
+              <a:t>Documenting</a:t>
+            </a:r>
+          </a:p>
+          <a:p>
+            <a:pPr lvl="1"/>
+            <a:r>
+              <a:rPr lang="tr-TR" dirty="0"/>
+              <a:t>Implementing</a:t>
+            </a:r>
+          </a:p>
+          <a:p>
+            <a:endParaRPr lang="tr-TR" dirty="0"/>
+          </a:p>
+          <a:p>
+            <a:pPr lvl="1"/>
+            <a:endParaRPr lang="tr-TR" dirty="0"/>
+          </a:p>
+          <a:p>
+            <a:endParaRPr lang="en-US" dirty="0"/>
+          </a:p>
+        </p:txBody>
+      </p:sp>
     </p:spTree>
     <p:extLst>
       <p:ext uri="{BB962C8B-B14F-4D97-AF65-F5344CB8AC3E}">
-        <p14:creationId xmlns:p14="http://schemas.microsoft.com/office/powerpoint/2010/main" val="1802754917"/>
+        <p14:creationId xmlns:p14="http://schemas.microsoft.com/office/powerpoint/2010/main" val="872615513"/>
       </p:ext>
     </p:extLst>
   </p:cSld>
@@ -5296,7 +5951,13 @@
       </p:grpSpPr>
       <p:sp>
         <p:nvSpPr>
-          <p:cNvPr id="2" name="Title 1"/>
+          <p:cNvPr id="8" name="Title 7">
+            <a:extLst>
+              <a:ext uri="{FF2B5EF4-FFF2-40B4-BE49-F238E27FC236}">
+                <a16:creationId xmlns:a16="http://schemas.microsoft.com/office/drawing/2014/main" id="{0293B498-FC58-4CC8-819D-BF50B41F1B64}"/>
+              </a:ext>
+            </a:extLst>
+          </p:cNvPr>
           <p:cNvSpPr>
             <a:spLocks noGrp="1"/>
           </p:cNvSpPr>
@@ -5309,88 +5970,49 @@
           <a:bodyPr/>
           <a:lstStyle/>
           <a:p>
-            <a:r>
-              <a:rPr lang="en-US" dirty="0"/>
-              <a:t>GUI</a:t>
-            </a:r>
-          </a:p>
-        </p:txBody>
-      </p:sp>
-      <p:sp>
-        <p:nvSpPr>
-          <p:cNvPr id="3" name="Content Placeholder 2"/>
-          <p:cNvSpPr>
-            <a:spLocks noGrp="1"/>
-          </p:cNvSpPr>
+            <a:endParaRPr lang="tr-TR" dirty="0"/>
+          </a:p>
+        </p:txBody>
+      </p:sp>
+      <p:pic>
+        <p:nvPicPr>
+          <p:cNvPr id="11" name="Content Placeholder 10">
+            <a:extLst>
+              <a:ext uri="{FF2B5EF4-FFF2-40B4-BE49-F238E27FC236}">
+                <a16:creationId xmlns:a16="http://schemas.microsoft.com/office/drawing/2014/main" id="{3A979073-D58F-4E4D-9C36-8FC4AE9E8F47}"/>
+              </a:ext>
+            </a:extLst>
+          </p:cNvPr>
+          <p:cNvPicPr>
+            <a:picLocks noGrp="1" noChangeAspect="1"/>
+          </p:cNvPicPr>
           <p:nvPr>
             <p:ph idx="1"/>
           </p:nvPr>
-        </p:nvSpPr>
-        <p:spPr/>
-        <p:txBody>
-          <a:bodyPr/>
-          <a:lstStyle/>
-          <a:p>
-            <a:r>
-              <a:rPr lang="en-US" dirty="0"/>
-              <a:t>Simplicity</a:t>
-            </a:r>
-          </a:p>
-          <a:p>
-            <a:r>
-              <a:rPr lang="en-US" dirty="0"/>
-              <a:t>Power</a:t>
-            </a:r>
-          </a:p>
-          <a:p>
-            <a:r>
-              <a:rPr lang="en-US" dirty="0"/>
-              <a:t>Diversity</a:t>
-            </a:r>
-          </a:p>
-          <a:p>
-            <a:r>
-              <a:rPr lang="en-US" dirty="0"/>
-              <a:t>Organization</a:t>
-            </a:r>
-          </a:p>
-          <a:p>
-            <a:pPr lvl="2"/>
-            <a:r>
-              <a:rPr lang="en-US" dirty="0"/>
-              <a:t>Main window</a:t>
-            </a:r>
-          </a:p>
-          <a:p>
-            <a:pPr lvl="2"/>
-            <a:r>
-              <a:rPr lang="en-US" dirty="0"/>
-              <a:t>Scan window</a:t>
-            </a:r>
-          </a:p>
-          <a:p>
-            <a:pPr lvl="2"/>
-            <a:r>
-              <a:rPr lang="en-US" dirty="0"/>
-              <a:t>Filter window</a:t>
-            </a:r>
-          </a:p>
-          <a:p>
-            <a:pPr lvl="2"/>
-            <a:r>
-              <a:rPr lang="en-US" dirty="0"/>
-              <a:t>Register window</a:t>
-            </a:r>
-          </a:p>
-          <a:p>
-            <a:endParaRPr lang="en-US" dirty="0"/>
-          </a:p>
-        </p:txBody>
-      </p:sp>
+        </p:nvPicPr>
+        <p:blipFill>
+          <a:blip r:embed="rId2">
+            <a:extLst>
+              <a:ext uri="{28A0092B-C50C-407E-A947-70E740481C1C}">
+                <a14:useLocalDpi xmlns:a14="http://schemas.microsoft.com/office/drawing/2010/main" val="0"/>
+              </a:ext>
+            </a:extLst>
+          </a:blip>
+          <a:stretch>
+            <a:fillRect/>
+          </a:stretch>
+        </p:blipFill>
+        <p:spPr>
+          <a:xfrm>
+            <a:off x="0" y="0"/>
+            <a:ext cx="12191999" cy="6858000"/>
+          </a:xfrm>
+        </p:spPr>
+      </p:pic>
     </p:spTree>
     <p:extLst>
       <p:ext uri="{BB962C8B-B14F-4D97-AF65-F5344CB8AC3E}">
-        <p14:creationId xmlns:p14="http://schemas.microsoft.com/office/powerpoint/2010/main" val="2923495858"/>
+        <p14:creationId xmlns:p14="http://schemas.microsoft.com/office/powerpoint/2010/main" val="1393239930"/>
       </p:ext>
     </p:extLst>
   </p:cSld>
@@ -5419,7 +6041,13 @@
       </p:grpSpPr>
       <p:sp>
         <p:nvSpPr>
-          <p:cNvPr id="2" name="Title 1"/>
+          <p:cNvPr id="8" name="Title 7">
+            <a:extLst>
+              <a:ext uri="{FF2B5EF4-FFF2-40B4-BE49-F238E27FC236}">
+                <a16:creationId xmlns:a16="http://schemas.microsoft.com/office/drawing/2014/main" id="{0293B498-FC58-4CC8-819D-BF50B41F1B64}"/>
+              </a:ext>
+            </a:extLst>
+          </p:cNvPr>
           <p:cNvSpPr>
             <a:spLocks noGrp="1"/>
           </p:cNvSpPr>
@@ -5432,45 +6060,48 @@
           <a:bodyPr/>
           <a:lstStyle/>
           <a:p>
-            <a:r>
-              <a:rPr lang="en-US" dirty="0"/>
-              <a:t>GUI – Main window</a:t>
-            </a:r>
+            <a:endParaRPr lang="tr-TR" dirty="0"/>
           </a:p>
         </p:txBody>
       </p:sp>
       <p:pic>
         <p:nvPicPr>
-          <p:cNvPr id="4" name="Picture 2" descr="C:\Users\Mladen\Downloads\Windows_-_MAGMA_Project\main_window.JPG"/>
+          <p:cNvPr id="5" name="Content Placeholder 4">
+            <a:extLst>
+              <a:ext uri="{FF2B5EF4-FFF2-40B4-BE49-F238E27FC236}">
+                <a16:creationId xmlns:a16="http://schemas.microsoft.com/office/drawing/2014/main" id="{064A8164-1852-4D28-A569-4E1E7D9E440A}"/>
+              </a:ext>
+            </a:extLst>
+          </p:cNvPr>
           <p:cNvPicPr>
-            <a:picLocks noGrp="1" noChangeAspect="1" noChangeArrowheads="1"/>
+            <a:picLocks noGrp="1" noChangeAspect="1"/>
           </p:cNvPicPr>
           <p:nvPr>
             <p:ph idx="1"/>
           </p:nvPr>
         </p:nvPicPr>
-        <p:blipFill>
-          <a:blip r:embed="rId2"/>
-          <a:srcRect/>
-          <a:stretch>
-            <a:fillRect/>
-          </a:stretch>
+        <p:blipFill rotWithShape="1">
+          <a:blip r:embed="rId2">
+            <a:extLst>
+              <a:ext uri="{28A0092B-C50C-407E-A947-70E740481C1C}">
+                <a14:useLocalDpi xmlns:a14="http://schemas.microsoft.com/office/drawing/2010/main" val="0"/>
+              </a:ext>
+            </a:extLst>
+          </a:blip>
+          <a:srcRect l="13641" t="2627" r="14033" b="1398"/>
+          <a:stretch/>
         </p:blipFill>
-        <p:spPr bwMode="auto">
+        <p:spPr>
           <a:xfrm>
-            <a:off x="3321611" y="1600201"/>
-            <a:ext cx="5548779" cy="4525963"/>
+            <a:off x="0" y="0"/>
+            <a:ext cx="12192000" cy="6858000"/>
           </a:xfrm>
-          <a:prstGeom prst="rect">
-            <a:avLst/>
-          </a:prstGeom>
-          <a:noFill/>
         </p:spPr>
       </p:pic>
     </p:spTree>
     <p:extLst>
       <p:ext uri="{BB962C8B-B14F-4D97-AF65-F5344CB8AC3E}">
-        <p14:creationId xmlns:p14="http://schemas.microsoft.com/office/powerpoint/2010/main" val="2665487860"/>
+        <p14:creationId xmlns:p14="http://schemas.microsoft.com/office/powerpoint/2010/main" val="2287252529"/>
       </p:ext>
     </p:extLst>
   </p:cSld>
@@ -5513,44 +6144,82 @@
           <a:lstStyle/>
           <a:p>
             <a:r>
-              <a:rPr lang="en-US" dirty="0"/>
-              <a:t>GUI – Filtering window</a:t>
-            </a:r>
+              <a:rPr lang="tr-TR" dirty="0"/>
+              <a:t>Coding habits</a:t>
+            </a:r>
+            <a:endParaRPr lang="en-US" dirty="0"/>
+          </a:p>
+        </p:txBody>
+      </p:sp>
+      <p:sp>
+        <p:nvSpPr>
+          <p:cNvPr id="3" name="Content Placeholder 2"/>
+          <p:cNvSpPr>
+            <a:spLocks noGrp="1"/>
+          </p:cNvSpPr>
+          <p:nvPr>
+            <p:ph idx="1"/>
+          </p:nvPr>
+        </p:nvSpPr>
+        <p:spPr/>
+        <p:txBody>
+          <a:bodyPr/>
+          <a:lstStyle/>
+          <a:p>
+            <a:endParaRPr lang="en-US" dirty="0"/>
+          </a:p>
+          <a:p>
+            <a:endParaRPr lang="tr-TR" dirty="0"/>
+          </a:p>
+          <a:p>
+            <a:pPr lvl="1"/>
+            <a:endParaRPr lang="tr-TR" dirty="0"/>
+          </a:p>
+          <a:p>
+            <a:endParaRPr lang="en-US" dirty="0"/>
           </a:p>
         </p:txBody>
       </p:sp>
       <p:pic>
         <p:nvPicPr>
-          <p:cNvPr id="3075" name="Picture 3" descr="C:\Users\Mladen\Downloads\Windows_-_MAGMA_Project\filter_window.JPG"/>
+          <p:cNvPr id="5" name="Picture 4">
+            <a:extLst>
+              <a:ext uri="{FF2B5EF4-FFF2-40B4-BE49-F238E27FC236}">
+                <a16:creationId xmlns:a16="http://schemas.microsoft.com/office/drawing/2014/main" id="{3598E3DB-9EBF-4796-B6C5-26CD04BDAA42}"/>
+              </a:ext>
+            </a:extLst>
+          </p:cNvPr>
           <p:cNvPicPr>
-            <a:picLocks noGrp="1" noChangeAspect="1" noChangeArrowheads="1"/>
+            <a:picLocks noChangeAspect="1"/>
           </p:cNvPicPr>
-          <p:nvPr>
-            <p:ph idx="1"/>
-          </p:nvPr>
+          <p:nvPr/>
         </p:nvPicPr>
         <p:blipFill>
-          <a:blip r:embed="rId2"/>
-          <a:srcRect/>
+          <a:blip r:embed="rId2">
+            <a:extLst>
+              <a:ext uri="{28A0092B-C50C-407E-A947-70E740481C1C}">
+                <a14:useLocalDpi xmlns:a14="http://schemas.microsoft.com/office/drawing/2010/main" val="0"/>
+              </a:ext>
+            </a:extLst>
+          </a:blip>
           <a:stretch>
             <a:fillRect/>
           </a:stretch>
         </p:blipFill>
-        <p:spPr bwMode="auto">
+        <p:spPr>
           <a:xfrm>
-            <a:off x="2673358" y="1600201"/>
-            <a:ext cx="6845284" cy="4525963"/>
+            <a:off x="1032756" y="2016664"/>
+            <a:ext cx="10126488" cy="3648584"/>
           </a:xfrm>
           <a:prstGeom prst="rect">
             <a:avLst/>
           </a:prstGeom>
-          <a:noFill/>
         </p:spPr>
       </p:pic>
     </p:spTree>
     <p:extLst>
       <p:ext uri="{BB962C8B-B14F-4D97-AF65-F5344CB8AC3E}">
-        <p14:creationId xmlns:p14="http://schemas.microsoft.com/office/powerpoint/2010/main" val="605894374"/>
+        <p14:creationId xmlns:p14="http://schemas.microsoft.com/office/powerpoint/2010/main" val="1038128985"/>
       </p:ext>
     </p:extLst>
   </p:cSld>

</xml_diff>

<commit_message>
Last changes on presentation
</commit_message>
<xml_diff>
--- a/Presentation/MAGMA Presentation.pptx
+++ b/Presentation/MAGMA Presentation.pptx
@@ -5,7 +5,7 @@
     <p:sldMasterId id="2147483648" r:id="rId1"/>
   </p:sldMasterIdLst>
   <p:handoutMasterIdLst>
-    <p:handoutMasterId r:id="rId32"/>
+    <p:handoutMasterId r:id="rId33"/>
   </p:handoutMasterIdLst>
   <p:sldIdLst>
     <p:sldId id="256" r:id="rId2"/>
@@ -29,15 +29,16 @@
     <p:sldId id="285" r:id="rId20"/>
     <p:sldId id="266" r:id="rId21"/>
     <p:sldId id="267" r:id="rId22"/>
-    <p:sldId id="262" r:id="rId23"/>
-    <p:sldId id="263" r:id="rId24"/>
-    <p:sldId id="264" r:id="rId25"/>
-    <p:sldId id="265" r:id="rId26"/>
-    <p:sldId id="284" r:id="rId27"/>
-    <p:sldId id="258" r:id="rId28"/>
-    <p:sldId id="259" r:id="rId29"/>
-    <p:sldId id="268" r:id="rId30"/>
-    <p:sldId id="274" r:id="rId31"/>
+    <p:sldId id="286" r:id="rId23"/>
+    <p:sldId id="262" r:id="rId24"/>
+    <p:sldId id="263" r:id="rId25"/>
+    <p:sldId id="264" r:id="rId26"/>
+    <p:sldId id="265" r:id="rId27"/>
+    <p:sldId id="284" r:id="rId28"/>
+    <p:sldId id="258" r:id="rId29"/>
+    <p:sldId id="259" r:id="rId30"/>
+    <p:sldId id="268" r:id="rId31"/>
+    <p:sldId id="274" r:id="rId32"/>
   </p:sldIdLst>
   <p:sldSz cx="12192000" cy="6858000"/>
   <p:notesSz cx="6858000" cy="9144000"/>
@@ -245,7 +246,7 @@
           <a:p>
             <a:fld id="{54B8EB75-3312-4A48-96EC-7BCF987C3AEE}" type="datetimeFigureOut">
               <a:rPr lang="en-US" smtClean="0"/>
-              <a:t>1/9/2018</a:t>
+              <a:t>1/10/2018</a:t>
             </a:fld>
             <a:endParaRPr lang="en-US"/>
           </a:p>
@@ -323,7 +324,7 @@
           <a:p>
             <a:fld id="{7F7270B0-FE68-4028-B367-495A1F77F935}" type="slidenum">
               <a:rPr lang="en-US" smtClean="0"/>
-              <a:t>‹#›</a:t>
+              <a:t>‹nº›</a:t>
             </a:fld>
             <a:endParaRPr lang="en-US"/>
           </a:p>
@@ -557,7 +558,7 @@
           <a:p>
             <a:fld id="{84563150-1304-452B-90AB-6F924A6BCF5F}" type="slidenum">
               <a:rPr lang="en-US" smtClean="0"/>
-              <a:t>‹#›</a:t>
+              <a:t>‹nº›</a:t>
             </a:fld>
             <a:endParaRPr lang="en-US"/>
           </a:p>
@@ -845,7 +846,7 @@
           <a:p>
             <a:fld id="{84563150-1304-452B-90AB-6F924A6BCF5F}" type="slidenum">
               <a:rPr lang="en-US" smtClean="0"/>
-              <a:t>‹#›</a:t>
+              <a:t>‹nº›</a:t>
             </a:fld>
             <a:endParaRPr lang="en-US"/>
           </a:p>
@@ -1055,7 +1056,7 @@
           <a:p>
             <a:fld id="{84563150-1304-452B-90AB-6F924A6BCF5F}" type="slidenum">
               <a:rPr lang="en-US" smtClean="0"/>
-              <a:t>‹#›</a:t>
+              <a:t>‹nº›</a:t>
             </a:fld>
             <a:endParaRPr lang="en-US"/>
           </a:p>
@@ -1255,7 +1256,7 @@
           <a:p>
             <a:fld id="{84563150-1304-452B-90AB-6F924A6BCF5F}" type="slidenum">
               <a:rPr lang="en-US" smtClean="0"/>
-              <a:t>‹#›</a:t>
+              <a:t>‹nº›</a:t>
             </a:fld>
             <a:endParaRPr lang="en-US"/>
           </a:p>
@@ -1531,7 +1532,7 @@
           <a:p>
             <a:fld id="{84563150-1304-452B-90AB-6F924A6BCF5F}" type="slidenum">
               <a:rPr lang="en-US" smtClean="0"/>
-              <a:t>‹#›</a:t>
+              <a:t>‹nº›</a:t>
             </a:fld>
             <a:endParaRPr lang="en-US"/>
           </a:p>
@@ -1799,7 +1800,7 @@
           <a:p>
             <a:fld id="{84563150-1304-452B-90AB-6F924A6BCF5F}" type="slidenum">
               <a:rPr lang="en-US" smtClean="0"/>
-              <a:t>‹#›</a:t>
+              <a:t>‹nº›</a:t>
             </a:fld>
             <a:endParaRPr lang="en-US"/>
           </a:p>
@@ -2214,7 +2215,7 @@
           <a:p>
             <a:fld id="{84563150-1304-452B-90AB-6F924A6BCF5F}" type="slidenum">
               <a:rPr lang="en-US" smtClean="0"/>
-              <a:t>‹#›</a:t>
+              <a:t>‹nº›</a:t>
             </a:fld>
             <a:endParaRPr lang="en-US"/>
           </a:p>
@@ -2356,7 +2357,7 @@
           <a:p>
             <a:fld id="{84563150-1304-452B-90AB-6F924A6BCF5F}" type="slidenum">
               <a:rPr lang="en-US" smtClean="0"/>
-              <a:t>‹#›</a:t>
+              <a:t>‹nº›</a:t>
             </a:fld>
             <a:endParaRPr lang="en-US"/>
           </a:p>
@@ -2469,7 +2470,7 @@
           <a:p>
             <a:fld id="{84563150-1304-452B-90AB-6F924A6BCF5F}" type="slidenum">
               <a:rPr lang="en-US" smtClean="0"/>
-              <a:t>‹#›</a:t>
+              <a:t>‹nº›</a:t>
             </a:fld>
             <a:endParaRPr lang="en-US"/>
           </a:p>
@@ -2782,7 +2783,7 @@
           <a:p>
             <a:fld id="{84563150-1304-452B-90AB-6F924A6BCF5F}" type="slidenum">
               <a:rPr lang="en-US" smtClean="0"/>
-              <a:t>‹#›</a:t>
+              <a:t>‹nº›</a:t>
             </a:fld>
             <a:endParaRPr lang="en-US"/>
           </a:p>
@@ -3071,7 +3072,7 @@
           <a:p>
             <a:fld id="{84563150-1304-452B-90AB-6F924A6BCF5F}" type="slidenum">
               <a:rPr lang="en-US" smtClean="0"/>
-              <a:t>‹#›</a:t>
+              <a:t>‹nº›</a:t>
             </a:fld>
             <a:endParaRPr lang="en-US"/>
           </a:p>
@@ -3350,7 +3351,7 @@
           <a:p>
             <a:fld id="{84563150-1304-452B-90AB-6F924A6BCF5F}" type="slidenum">
               <a:rPr lang="en-US" smtClean="0"/>
-              <a:t>‹#›</a:t>
+              <a:t>‹nº›</a:t>
             </a:fld>
             <a:endParaRPr lang="en-US"/>
           </a:p>
@@ -4144,7 +4145,7 @@
         </p:nvSpPr>
         <p:spPr>
           <a:xfrm>
-            <a:off x="2152650" y="1825626"/>
+            <a:off x="1537879" y="1844810"/>
             <a:ext cx="7039694" cy="883295"/>
           </a:xfrm>
         </p:spPr>
@@ -4166,10 +4167,10 @@
       </p:sp>
       <p:pic>
         <p:nvPicPr>
-          <p:cNvPr id="14" name="Picture 13">
-            <a:extLst>
-              <a:ext uri="{FF2B5EF4-FFF2-40B4-BE49-F238E27FC236}">
-                <a16:creationId xmlns:a16="http://schemas.microsoft.com/office/drawing/2014/main" id="{9960B8C5-EC72-4766-8E56-D6864F170E84}"/>
+          <p:cNvPr id="16" name="Picture 15">
+            <a:extLst>
+              <a:ext uri="{FF2B5EF4-FFF2-40B4-BE49-F238E27FC236}">
+                <a16:creationId xmlns:a16="http://schemas.microsoft.com/office/drawing/2014/main" id="{F65B1117-6752-4095-B6F8-8E11401C7528}"/>
               </a:ext>
             </a:extLst>
           </p:cNvPr>
@@ -4192,8 +4193,8 @@
         </p:blipFill>
         <p:spPr>
           <a:xfrm>
-            <a:off x="4367808" y="3655436"/>
-            <a:ext cx="3096344" cy="2482265"/>
+            <a:off x="1453154" y="2884351"/>
+            <a:ext cx="7209145" cy="1234547"/>
           </a:xfrm>
           <a:prstGeom prst="rect">
             <a:avLst/>
@@ -4202,10 +4203,10 @@
       </p:pic>
       <p:pic>
         <p:nvPicPr>
-          <p:cNvPr id="16" name="Picture 15">
-            <a:extLst>
-              <a:ext uri="{FF2B5EF4-FFF2-40B4-BE49-F238E27FC236}">
-                <a16:creationId xmlns:a16="http://schemas.microsoft.com/office/drawing/2014/main" id="{F65B1117-6752-4095-B6F8-8E11401C7528}"/>
+          <p:cNvPr id="14" name="Picture 13">
+            <a:extLst>
+              <a:ext uri="{FF2B5EF4-FFF2-40B4-BE49-F238E27FC236}">
+                <a16:creationId xmlns:a16="http://schemas.microsoft.com/office/drawing/2014/main" id="{9960B8C5-EC72-4766-8E56-D6864F170E84}"/>
               </a:ext>
             </a:extLst>
           </p:cNvPr>
@@ -4228,8 +4229,8 @@
         </p:blipFill>
         <p:spPr>
           <a:xfrm>
-            <a:off x="2311407" y="2564905"/>
-            <a:ext cx="7209145" cy="1234547"/>
+            <a:off x="6424208" y="3429000"/>
+            <a:ext cx="3096344" cy="2482265"/>
           </a:xfrm>
           <a:prstGeom prst="rect">
             <a:avLst/>
@@ -4308,7 +4309,7 @@
         </p:nvSpPr>
         <p:spPr>
           <a:xfrm>
-            <a:off x="2152650" y="1324265"/>
+            <a:off x="1928081" y="1493935"/>
             <a:ext cx="8335838" cy="1061829"/>
           </a:xfrm>
           <a:prstGeom prst="rect">
@@ -4377,7 +4378,7 @@
         </p:blipFill>
         <p:spPr>
           <a:xfrm>
-            <a:off x="1523999" y="2379301"/>
+            <a:off x="1042736" y="2555764"/>
             <a:ext cx="9144000" cy="1439056"/>
           </a:xfrm>
           <a:prstGeom prst="rect">
@@ -4415,7 +4416,7 @@
         </p:blipFill>
         <p:spPr>
           <a:xfrm>
-            <a:off x="4511824" y="3521208"/>
+            <a:off x="6444898" y="3192345"/>
             <a:ext cx="3600400" cy="2829582"/>
           </a:xfrm>
         </p:spPr>
@@ -4496,7 +4497,7 @@
         </p:nvSpPr>
         <p:spPr>
           <a:xfrm>
-            <a:off x="2639616" y="1370734"/>
+            <a:off x="973875" y="1605477"/>
             <a:ext cx="5832648" cy="1266178"/>
           </a:xfrm>
         </p:spPr>
@@ -4553,7 +4554,7 @@
         </p:blipFill>
         <p:spPr>
           <a:xfrm>
-            <a:off x="2152651" y="2420888"/>
+            <a:off x="740945" y="3176972"/>
             <a:ext cx="6298509" cy="1512168"/>
           </a:xfrm>
           <a:prstGeom prst="rect">
@@ -4591,7 +4592,7 @@
         </p:blipFill>
         <p:spPr>
           <a:xfrm>
-            <a:off x="6118496" y="3579054"/>
+            <a:off x="7867650" y="3176972"/>
             <a:ext cx="3486150" cy="2808312"/>
           </a:xfrm>
         </p:spPr>
@@ -4642,15 +4643,10 @@
             <p:ph type="title"/>
           </p:nvPr>
         </p:nvSpPr>
-        <p:spPr>
-          <a:xfrm>
-            <a:off x="2152650" y="365128"/>
-            <a:ext cx="7886700" cy="935035"/>
-          </a:xfrm>
-        </p:spPr>
+        <p:spPr/>
         <p:txBody>
           <a:bodyPr>
-            <a:normAutofit fontScale="90000"/>
+            <a:normAutofit/>
           </a:bodyPr>
           <a:lstStyle/>
           <a:p>
@@ -4658,10 +4654,6 @@
               <a:rPr lang="tr-TR" dirty="0"/>
               <a:t>Need to set logical parameters</a:t>
             </a:r>
-            <a:br>
-              <a:rPr lang="tr-TR" dirty="0"/>
-            </a:br>
-            <a:endParaRPr lang="tr-TR" dirty="0"/>
           </a:p>
         </p:txBody>
       </p:sp>
@@ -4678,15 +4670,10 @@
             <a:spLocks noGrp="1"/>
           </p:cNvSpPr>
           <p:nvPr>
-            <p:ph sz="half" idx="1"/>
-          </p:nvPr>
-        </p:nvSpPr>
-        <p:spPr>
-          <a:xfrm>
-            <a:off x="0" y="1300163"/>
-            <a:ext cx="12192000" cy="5038493"/>
-          </a:xfrm>
-        </p:spPr>
+            <p:ph idx="1"/>
+          </p:nvPr>
+        </p:nvSpPr>
+        <p:spPr/>
         <p:txBody>
           <a:bodyPr/>
           <a:lstStyle/>
@@ -4811,7 +4798,7 @@
         </p:blipFill>
         <p:spPr>
           <a:xfrm>
-            <a:off x="876903" y="2865071"/>
+            <a:off x="838200" y="3001429"/>
             <a:ext cx="7437765" cy="563929"/>
           </a:xfrm>
           <a:prstGeom prst="rect">
@@ -6284,6 +6271,42 @@
           </a:p>
           <a:p>
             <a:r>
+              <a:rPr lang="pt-BR" dirty="0" err="1"/>
+              <a:t>Callback</a:t>
+            </a:r>
+            <a:r>
+              <a:rPr lang="pt-BR" dirty="0"/>
+              <a:t> </a:t>
+            </a:r>
+            <a:r>
+              <a:rPr lang="pt-BR" dirty="0" err="1"/>
+              <a:t>function</a:t>
+            </a:r>
+            <a:r>
+              <a:rPr lang="pt-BR" dirty="0"/>
+              <a:t> </a:t>
+            </a:r>
+            <a:r>
+              <a:rPr lang="pt-BR" dirty="0" err="1"/>
+              <a:t>to</a:t>
+            </a:r>
+            <a:r>
+              <a:rPr lang="pt-BR" dirty="0"/>
+              <a:t> keyboard</a:t>
+            </a:r>
+          </a:p>
+          <a:p>
+            <a:r>
+              <a:rPr lang="pt-BR" dirty="0" err="1"/>
+              <a:t>Bounding</a:t>
+            </a:r>
+            <a:r>
+              <a:rPr lang="pt-BR" dirty="0"/>
+              <a:t> box</a:t>
+            </a:r>
+          </a:p>
+          <a:p>
+            <a:r>
               <a:rPr lang="pt-BR" dirty="0"/>
               <a:t>Live </a:t>
             </a:r>
@@ -6317,70 +6340,8 @@
             </a:r>
             <a:endParaRPr lang="pt-BR" dirty="0"/>
           </a:p>
-          <a:p>
-            <a:r>
-              <a:rPr lang="pt-BR" dirty="0"/>
-              <a:t>Point </a:t>
-            </a:r>
-            <a:r>
-              <a:rPr lang="pt-BR" dirty="0" err="1"/>
-              <a:t>cloud</a:t>
-            </a:r>
-            <a:r>
-              <a:rPr lang="pt-BR" dirty="0"/>
-              <a:t> display </a:t>
-            </a:r>
-            <a:r>
-              <a:rPr lang="pt-BR" dirty="0" err="1"/>
-              <a:t>on</a:t>
-            </a:r>
-            <a:r>
-              <a:rPr lang="pt-BR" dirty="0"/>
-              <a:t> VTK </a:t>
-            </a:r>
-            <a:r>
-              <a:rPr lang="pt-BR" dirty="0" err="1"/>
-              <a:t>Widget</a:t>
-            </a:r>
-            <a:endParaRPr lang="en-US" dirty="0"/>
-          </a:p>
-        </p:txBody>
-      </p:sp>
-      <p:pic>
-        <p:nvPicPr>
-          <p:cNvPr id="8" name="Imagem 7" descr="Uma imagem contendo captura de tela&#10;&#10;Descrição gerada com muito alta confiança">
-            <a:extLst>
-              <a:ext uri="{FF2B5EF4-FFF2-40B4-BE49-F238E27FC236}">
-                <a16:creationId xmlns:a16="http://schemas.microsoft.com/office/drawing/2014/main" id="{FCA44CEA-72DA-4FB7-B97A-0C6B595297DB}"/>
-              </a:ext>
-            </a:extLst>
-          </p:cNvPr>
-          <p:cNvPicPr>
-            <a:picLocks noChangeAspect="1"/>
-          </p:cNvPicPr>
-          <p:nvPr/>
-        </p:nvPicPr>
-        <p:blipFill rotWithShape="1">
-          <a:blip r:embed="rId2">
-            <a:extLst>
-              <a:ext uri="{28A0092B-C50C-407E-A947-70E740481C1C}">
-                <a14:useLocalDpi xmlns:a14="http://schemas.microsoft.com/office/drawing/2010/main" val="0"/>
-              </a:ext>
-            </a:extLst>
-          </a:blip>
-          <a:srcRect l="34933" t="12065" r="3594" b="20875"/>
-          <a:stretch/>
-        </p:blipFill>
-        <p:spPr>
-          <a:xfrm>
-            <a:off x="6881857" y="3307693"/>
-            <a:ext cx="3216442" cy="2869270"/>
-          </a:xfrm>
-          <a:prstGeom prst="rect">
-            <a:avLst/>
-          </a:prstGeom>
-        </p:spPr>
-      </p:pic>
+        </p:txBody>
+      </p:sp>
       <p:pic>
         <p:nvPicPr>
           <p:cNvPr id="10" name="Imagem 9" descr="Uma imagem contendo captura de tela&#10;&#10;Descrição gerada com alta confiança">
@@ -6396,7 +6357,7 @@
           <p:nvPr/>
         </p:nvPicPr>
         <p:blipFill>
-          <a:blip r:embed="rId3">
+          <a:blip r:embed="rId2">
             <a:extLst>
               <a:ext uri="{28A0092B-C50C-407E-A947-70E740481C1C}">
                 <a14:useLocalDpi xmlns:a14="http://schemas.microsoft.com/office/drawing/2010/main" val="0"/>
@@ -6449,6 +6410,200 @@
       </p:grpSpPr>
       <p:sp>
         <p:nvSpPr>
+          <p:cNvPr id="2" name="Título 1">
+            <a:extLst>
+              <a:ext uri="{FF2B5EF4-FFF2-40B4-BE49-F238E27FC236}">
+                <a16:creationId xmlns:a16="http://schemas.microsoft.com/office/drawing/2014/main" id="{8858D6B5-9AAA-4853-A882-861134185C73}"/>
+              </a:ext>
+            </a:extLst>
+          </p:cNvPr>
+          <p:cNvSpPr>
+            <a:spLocks noGrp="1"/>
+          </p:cNvSpPr>
+          <p:nvPr>
+            <p:ph type="title"/>
+          </p:nvPr>
+        </p:nvSpPr>
+        <p:spPr/>
+        <p:txBody>
+          <a:bodyPr/>
+          <a:lstStyle/>
+          <a:p>
+            <a:r>
+              <a:rPr lang="pt-BR" dirty="0"/>
+              <a:t>Input / Output</a:t>
+            </a:r>
+            <a:endParaRPr lang="en-US" dirty="0"/>
+          </a:p>
+        </p:txBody>
+      </p:sp>
+      <p:sp>
+        <p:nvSpPr>
+          <p:cNvPr id="3" name="Espaço Reservado para Conteúdo 2">
+            <a:extLst>
+              <a:ext uri="{FF2B5EF4-FFF2-40B4-BE49-F238E27FC236}">
+                <a16:creationId xmlns:a16="http://schemas.microsoft.com/office/drawing/2014/main" id="{D0A14398-1B2D-431B-A878-2C9ED8C049C9}"/>
+              </a:ext>
+            </a:extLst>
+          </p:cNvPr>
+          <p:cNvSpPr>
+            <a:spLocks noGrp="1"/>
+          </p:cNvSpPr>
+          <p:nvPr>
+            <p:ph idx="1"/>
+          </p:nvPr>
+        </p:nvSpPr>
+        <p:spPr>
+          <a:xfrm>
+            <a:off x="838200" y="1504950"/>
+            <a:ext cx="5538537" cy="4672013"/>
+          </a:xfrm>
+        </p:spPr>
+        <p:txBody>
+          <a:bodyPr/>
+          <a:lstStyle/>
+          <a:p>
+            <a:r>
+              <a:rPr lang="pt-BR" dirty="0"/>
+              <a:t>Point </a:t>
+            </a:r>
+            <a:r>
+              <a:rPr lang="pt-BR" dirty="0" err="1"/>
+              <a:t>cloud</a:t>
+            </a:r>
+            <a:r>
+              <a:rPr lang="pt-BR" dirty="0"/>
+              <a:t> display </a:t>
+            </a:r>
+            <a:r>
+              <a:rPr lang="pt-BR" dirty="0" err="1"/>
+              <a:t>on</a:t>
+            </a:r>
+            <a:r>
+              <a:rPr lang="pt-BR" dirty="0"/>
+              <a:t> VTK </a:t>
+            </a:r>
+            <a:r>
+              <a:rPr lang="pt-BR" dirty="0" err="1"/>
+              <a:t>Widget</a:t>
+            </a:r>
+            <a:endParaRPr lang="pt-BR" dirty="0"/>
+          </a:p>
+          <a:p>
+            <a:r>
+              <a:rPr lang="pt-BR" dirty="0"/>
+              <a:t>Displays </a:t>
+            </a:r>
+            <a:r>
+              <a:rPr lang="pt-BR" dirty="0" err="1"/>
+              <a:t>raw</a:t>
+            </a:r>
+            <a:r>
+              <a:rPr lang="pt-BR" dirty="0"/>
+              <a:t> point </a:t>
+            </a:r>
+            <a:r>
+              <a:rPr lang="pt-BR" dirty="0" err="1"/>
+              <a:t>clouds</a:t>
+            </a:r>
+            <a:r>
+              <a:rPr lang="pt-BR" dirty="0"/>
+              <a:t>, </a:t>
+            </a:r>
+            <a:r>
+              <a:rPr lang="pt-BR" dirty="0" err="1"/>
+              <a:t>registered</a:t>
+            </a:r>
+            <a:r>
+              <a:rPr lang="pt-BR" dirty="0"/>
+              <a:t> PCs </a:t>
+            </a:r>
+            <a:r>
+              <a:rPr lang="pt-BR" dirty="0" err="1"/>
+              <a:t>and</a:t>
+            </a:r>
+            <a:r>
+              <a:rPr lang="pt-BR" dirty="0"/>
+              <a:t> </a:t>
+            </a:r>
+            <a:r>
+              <a:rPr lang="pt-BR" dirty="0" err="1"/>
+              <a:t>mesh</a:t>
+            </a:r>
+            <a:endParaRPr lang="en-US" dirty="0"/>
+          </a:p>
+          <a:p>
+            <a:endParaRPr lang="en-US" dirty="0"/>
+          </a:p>
+        </p:txBody>
+      </p:sp>
+      <p:pic>
+        <p:nvPicPr>
+          <p:cNvPr id="4" name="Imagem 3" descr="Uma imagem contendo captura de tela&#10;&#10;Descrição gerada com muito alta confiança">
+            <a:extLst>
+              <a:ext uri="{FF2B5EF4-FFF2-40B4-BE49-F238E27FC236}">
+                <a16:creationId xmlns:a16="http://schemas.microsoft.com/office/drawing/2014/main" id="{5FFE7EB7-E542-4F12-BD3C-036E39A2F189}"/>
+              </a:ext>
+            </a:extLst>
+          </p:cNvPr>
+          <p:cNvPicPr>
+            <a:picLocks noChangeAspect="1"/>
+          </p:cNvPicPr>
+          <p:nvPr/>
+        </p:nvPicPr>
+        <p:blipFill rotWithShape="1">
+          <a:blip r:embed="rId2">
+            <a:extLst>
+              <a:ext uri="{28A0092B-C50C-407E-A947-70E740481C1C}">
+                <a14:useLocalDpi xmlns:a14="http://schemas.microsoft.com/office/drawing/2010/main" val="0"/>
+              </a:ext>
+            </a:extLst>
+          </a:blip>
+          <a:srcRect l="34933" t="12065" r="3594" b="20875"/>
+          <a:stretch/>
+        </p:blipFill>
+        <p:spPr>
+          <a:xfrm>
+            <a:off x="6729457" y="1504950"/>
+            <a:ext cx="3216442" cy="2869270"/>
+          </a:xfrm>
+          <a:prstGeom prst="rect">
+            <a:avLst/>
+          </a:prstGeom>
+        </p:spPr>
+      </p:pic>
+    </p:spTree>
+    <p:extLst>
+      <p:ext uri="{BB962C8B-B14F-4D97-AF65-F5344CB8AC3E}">
+        <p14:creationId xmlns:p14="http://schemas.microsoft.com/office/powerpoint/2010/main" val="1532814575"/>
+      </p:ext>
+    </p:extLst>
+  </p:cSld>
+  <p:clrMapOvr>
+    <a:masterClrMapping/>
+  </p:clrMapOvr>
+</p:sld>
+</file>
+
+<file path=ppt/slides/slide23.xml><?xml version="1.0" encoding="utf-8"?>
+<p:sld xmlns:a="http://schemas.openxmlformats.org/drawingml/2006/main" xmlns:r="http://schemas.openxmlformats.org/officeDocument/2006/relationships" xmlns:p="http://schemas.openxmlformats.org/presentationml/2006/main">
+  <p:cSld>
+    <p:spTree>
+      <p:nvGrpSpPr>
+        <p:cNvPr id="1" name=""/>
+        <p:cNvGrpSpPr/>
+        <p:nvPr/>
+      </p:nvGrpSpPr>
+      <p:grpSpPr>
+        <a:xfrm>
+          <a:off x="0" y="0"/>
+          <a:ext cx="0" cy="0"/>
+          <a:chOff x="0" y="0"/>
+          <a:chExt cx="0" cy="0"/>
+        </a:xfrm>
+      </p:grpSpPr>
+      <p:sp>
+        <p:nvSpPr>
           <p:cNvPr id="2" name="Title 1"/>
           <p:cNvSpPr>
             <a:spLocks noGrp="1"/>
@@ -6553,7 +6708,7 @@
 </p:sld>
 </file>
 
-<file path=ppt/slides/slide23.xml><?xml version="1.0" encoding="utf-8"?>
+<file path=ppt/slides/slide24.xml><?xml version="1.0" encoding="utf-8"?>
 <p:sld xmlns:a="http://schemas.openxmlformats.org/drawingml/2006/main" xmlns:r="http://schemas.openxmlformats.org/officeDocument/2006/relationships" xmlns:p="http://schemas.openxmlformats.org/presentationml/2006/main">
   <p:cSld>
     <p:spTree>
@@ -6633,7 +6788,7 @@
 </p:sld>
 </file>
 
-<file path=ppt/slides/slide24.xml><?xml version="1.0" encoding="utf-8"?>
+<file path=ppt/slides/slide25.xml><?xml version="1.0" encoding="utf-8"?>
 <p:sld xmlns:a="http://schemas.openxmlformats.org/drawingml/2006/main" xmlns:r="http://schemas.openxmlformats.org/officeDocument/2006/relationships" xmlns:p="http://schemas.openxmlformats.org/presentationml/2006/main">
   <p:cSld>
     <p:spTree>
@@ -6713,7 +6868,7 @@
 </p:sld>
 </file>
 
-<file path=ppt/slides/slide25.xml><?xml version="1.0" encoding="utf-8"?>
+<file path=ppt/slides/slide26.xml><?xml version="1.0" encoding="utf-8"?>
 <p:sld xmlns:a="http://schemas.openxmlformats.org/drawingml/2006/main" xmlns:r="http://schemas.openxmlformats.org/officeDocument/2006/relationships" xmlns:p="http://schemas.openxmlformats.org/presentationml/2006/main">
   <p:cSld>
     <p:spTree>
@@ -6800,166 +6955,6 @@
 </p:sld>
 </file>
 
-<file path=ppt/slides/slide26.xml><?xml version="1.0" encoding="utf-8"?>
-<p:sld xmlns:a="http://schemas.openxmlformats.org/drawingml/2006/main" xmlns:r="http://schemas.openxmlformats.org/officeDocument/2006/relationships" xmlns:p="http://schemas.openxmlformats.org/presentationml/2006/main">
-  <p:cSld>
-    <p:spTree>
-      <p:nvGrpSpPr>
-        <p:cNvPr id="1" name=""/>
-        <p:cNvGrpSpPr/>
-        <p:nvPr/>
-      </p:nvGrpSpPr>
-      <p:grpSpPr>
-        <a:xfrm>
-          <a:off x="0" y="0"/>
-          <a:ext cx="0" cy="0"/>
-          <a:chOff x="0" y="0"/>
-          <a:chExt cx="0" cy="0"/>
-        </a:xfrm>
-      </p:grpSpPr>
-      <p:sp>
-        <p:nvSpPr>
-          <p:cNvPr id="2" name="Título 1">
-            <a:extLst>
-              <a:ext uri="{FF2B5EF4-FFF2-40B4-BE49-F238E27FC236}">
-                <a16:creationId xmlns:a16="http://schemas.microsoft.com/office/drawing/2014/main" id="{2903DB59-31D9-40AC-9D02-9E05E2690438}"/>
-              </a:ext>
-            </a:extLst>
-          </p:cNvPr>
-          <p:cNvSpPr>
-            <a:spLocks noGrp="1"/>
-          </p:cNvSpPr>
-          <p:nvPr>
-            <p:ph type="title"/>
-          </p:nvPr>
-        </p:nvSpPr>
-        <p:spPr/>
-        <p:txBody>
-          <a:bodyPr/>
-          <a:lstStyle/>
-          <a:p>
-            <a:r>
-              <a:rPr lang="tr-TR" dirty="0"/>
-              <a:t>Results</a:t>
-            </a:r>
-            <a:endParaRPr lang="en-US" dirty="0"/>
-          </a:p>
-        </p:txBody>
-      </p:sp>
-      <p:sp>
-        <p:nvSpPr>
-          <p:cNvPr id="9" name="Content Placeholder 8">
-            <a:extLst>
-              <a:ext uri="{FF2B5EF4-FFF2-40B4-BE49-F238E27FC236}">
-                <a16:creationId xmlns:a16="http://schemas.microsoft.com/office/drawing/2014/main" id="{742BCBA7-A9F7-4773-A1AB-8BDE24DAC5D2}"/>
-              </a:ext>
-            </a:extLst>
-          </p:cNvPr>
-          <p:cNvSpPr>
-            <a:spLocks noGrp="1"/>
-          </p:cNvSpPr>
-          <p:nvPr>
-            <p:ph sz="half" idx="1"/>
-          </p:nvPr>
-        </p:nvSpPr>
-        <p:spPr>
-          <a:xfrm>
-            <a:off x="1919536" y="1616224"/>
-            <a:ext cx="8119814" cy="4351338"/>
-          </a:xfrm>
-        </p:spPr>
-        <p:txBody>
-          <a:bodyPr>
-            <a:normAutofit fontScale="92500" lnSpcReduction="20000"/>
-          </a:bodyPr>
-          <a:lstStyle/>
-          <a:p>
-            <a:r>
-              <a:rPr lang="tr-TR" dirty="0"/>
-              <a:t>One folder installation</a:t>
-            </a:r>
-          </a:p>
-          <a:p>
-            <a:r>
-              <a:rPr lang="tr-TR" dirty="0"/>
-              <a:t>Deployed software</a:t>
-            </a:r>
-          </a:p>
-          <a:p>
-            <a:r>
-              <a:rPr lang="tr-TR" dirty="0"/>
-              <a:t>Logger</a:t>
-            </a:r>
-          </a:p>
-          <a:p>
-            <a:r>
-              <a:rPr lang="tr-TR" dirty="0"/>
-              <a:t>GUI Friendly</a:t>
-            </a:r>
-          </a:p>
-          <a:p>
-            <a:r>
-              <a:rPr lang="tr-TR" dirty="0"/>
-              <a:t>Good documentation</a:t>
-            </a:r>
-          </a:p>
-          <a:p>
-            <a:r>
-              <a:rPr lang="tr-TR" dirty="0"/>
-              <a:t>Interfacing</a:t>
-            </a:r>
-          </a:p>
-          <a:p>
-            <a:r>
-              <a:rPr lang="tr-TR" dirty="0"/>
-              <a:t>Readable code</a:t>
-            </a:r>
-          </a:p>
-          <a:p>
-            <a:r>
-              <a:rPr lang="tr-TR" dirty="0"/>
-              <a:t>Working filters</a:t>
-            </a:r>
-          </a:p>
-          <a:p>
-            <a:r>
-              <a:rPr lang="tr-TR" dirty="0"/>
-              <a:t>Correspondence basics</a:t>
-            </a:r>
-          </a:p>
-          <a:p>
-            <a:r>
-              <a:rPr lang="tr-TR" dirty="0"/>
-              <a:t>Bounding box</a:t>
-            </a:r>
-          </a:p>
-          <a:p>
-            <a:endParaRPr lang="tr-TR" dirty="0"/>
-          </a:p>
-          <a:p>
-            <a:endParaRPr lang="tr-TR" dirty="0"/>
-          </a:p>
-          <a:p>
-            <a:endParaRPr lang="tr-TR" dirty="0"/>
-          </a:p>
-          <a:p>
-            <a:endParaRPr lang="tr-TR" dirty="0"/>
-          </a:p>
-        </p:txBody>
-      </p:sp>
-    </p:spTree>
-    <p:extLst>
-      <p:ext uri="{BB962C8B-B14F-4D97-AF65-F5344CB8AC3E}">
-        <p14:creationId xmlns:p14="http://schemas.microsoft.com/office/powerpoint/2010/main" val="2232659882"/>
-      </p:ext>
-    </p:extLst>
-  </p:cSld>
-  <p:clrMapOvr>
-    <a:masterClrMapping/>
-  </p:clrMapOvr>
-</p:sld>
-</file>
-
 <file path=ppt/slides/slide27.xml><?xml version="1.0" encoding="utf-8"?>
 <p:sld xmlns:a="http://schemas.openxmlformats.org/drawingml/2006/main" xmlns:r="http://schemas.openxmlformats.org/officeDocument/2006/relationships" xmlns:p="http://schemas.openxmlformats.org/presentationml/2006/main">
   <p:cSld>
@@ -6982,7 +6977,7 @@
           <p:cNvPr id="2" name="Título 1">
             <a:extLst>
               <a:ext uri="{FF2B5EF4-FFF2-40B4-BE49-F238E27FC236}">
-                <a16:creationId xmlns:a16="http://schemas.microsoft.com/office/drawing/2014/main" id="{70FB1208-8BC8-4079-83A3-622F33B01E23}"/>
+                <a16:creationId xmlns:a16="http://schemas.microsoft.com/office/drawing/2014/main" id="{2903DB59-31D9-40AC-9D02-9E05E2690438}"/>
               </a:ext>
             </a:extLst>
           </p:cNvPr>
@@ -6999,12 +6994,8 @@
           <a:lstStyle/>
           <a:p>
             <a:r>
-              <a:rPr lang="pt-BR" dirty="0"/>
-              <a:t>Future </a:t>
-            </a:r>
-            <a:r>
-              <a:rPr lang="pt-BR" dirty="0" err="1"/>
-              <a:t>Work</a:t>
+              <a:rPr lang="tr-TR" dirty="0"/>
+              <a:t>Results</a:t>
             </a:r>
             <a:endParaRPr lang="en-US" dirty="0"/>
           </a:p>
@@ -7012,10 +7003,10 @@
       </p:sp>
       <p:sp>
         <p:nvSpPr>
-          <p:cNvPr id="3" name="Espaço Reservado para Conteúdo 2">
-            <a:extLst>
-              <a:ext uri="{FF2B5EF4-FFF2-40B4-BE49-F238E27FC236}">
-                <a16:creationId xmlns:a16="http://schemas.microsoft.com/office/drawing/2014/main" id="{A6486A13-9AFB-4B89-A1CB-332FEB8DE68C}"/>
+          <p:cNvPr id="9" name="Content Placeholder 8">
+            <a:extLst>
+              <a:ext uri="{FF2B5EF4-FFF2-40B4-BE49-F238E27FC236}">
+                <a16:creationId xmlns:a16="http://schemas.microsoft.com/office/drawing/2014/main" id="{742BCBA7-A9F7-4773-A1AB-8BDE24DAC5D2}"/>
               </a:ext>
             </a:extLst>
           </p:cNvPr>
@@ -7028,159 +7019,88 @@
         </p:nvSpPr>
         <p:spPr/>
         <p:txBody>
-          <a:bodyPr/>
-          <a:lstStyle/>
-          <a:p>
-            <a:r>
-              <a:rPr lang="pt-BR" dirty="0" err="1"/>
-              <a:t>Meshing</a:t>
-            </a:r>
-            <a:endParaRPr lang="pt-BR" dirty="0"/>
-          </a:p>
-          <a:p>
-            <a:r>
-              <a:rPr lang="pt-BR" dirty="0" err="1"/>
-              <a:t>Good</a:t>
-            </a:r>
-            <a:r>
-              <a:rPr lang="pt-BR" dirty="0"/>
-              <a:t> </a:t>
-            </a:r>
-            <a:r>
-              <a:rPr lang="pt-BR" dirty="0" err="1"/>
-              <a:t>parameters</a:t>
-            </a:r>
-            <a:endParaRPr lang="pt-BR" dirty="0"/>
-          </a:p>
-          <a:p>
-            <a:r>
-              <a:rPr lang="pt-BR" dirty="0" err="1"/>
-              <a:t>Redirect</a:t>
-            </a:r>
-            <a:r>
-              <a:rPr lang="pt-BR" dirty="0"/>
-              <a:t> </a:t>
-            </a:r>
-            <a:r>
-              <a:rPr lang="pt-BR" dirty="0" err="1"/>
-              <a:t>std</a:t>
-            </a:r>
-            <a:r>
-              <a:rPr lang="pt-BR" dirty="0"/>
-              <a:t>::</a:t>
-            </a:r>
-            <a:r>
-              <a:rPr lang="pt-BR" dirty="0" err="1"/>
-              <a:t>cout</a:t>
-            </a:r>
-            <a:r>
-              <a:rPr lang="pt-BR" dirty="0"/>
-              <a:t> </a:t>
-            </a:r>
-            <a:r>
-              <a:rPr lang="pt-BR" dirty="0" err="1"/>
-              <a:t>to</a:t>
-            </a:r>
-            <a:r>
-              <a:rPr lang="pt-BR" dirty="0"/>
-              <a:t> </a:t>
-            </a:r>
-            <a:r>
-              <a:rPr lang="pt-BR" dirty="0" err="1"/>
-              <a:t>logger</a:t>
-            </a:r>
-            <a:endParaRPr lang="pt-BR" dirty="0"/>
-          </a:p>
-          <a:p>
-            <a:r>
-              <a:rPr lang="pt-BR" dirty="0"/>
-              <a:t>Horizontal / Vertical </a:t>
-            </a:r>
-            <a:r>
-              <a:rPr lang="pt-BR" dirty="0" err="1"/>
-              <a:t>acquisition</a:t>
-            </a:r>
-            <a:r>
-              <a:rPr lang="pt-BR" dirty="0"/>
-              <a:t> </a:t>
-            </a:r>
-            <a:r>
-              <a:rPr lang="pt-BR" dirty="0" err="1"/>
-              <a:t>modes</a:t>
-            </a:r>
-            <a:endParaRPr lang="pt-BR" dirty="0"/>
-          </a:p>
-          <a:p>
-            <a:r>
-              <a:rPr lang="pt-BR" dirty="0" err="1"/>
-              <a:t>Configuration</a:t>
-            </a:r>
-            <a:r>
-              <a:rPr lang="pt-BR" dirty="0"/>
-              <a:t> files</a:t>
-            </a:r>
-          </a:p>
-          <a:p>
-            <a:r>
-              <a:rPr lang="pt-BR" dirty="0"/>
-              <a:t>Full screen </a:t>
-            </a:r>
+          <a:bodyPr>
+            <a:normAutofit fontScale="92500" lnSpcReduction="10000"/>
+          </a:bodyPr>
+          <a:lstStyle/>
+          <a:p>
             <a:r>
               <a:rPr lang="tr-TR" dirty="0"/>
-              <a:t>application</a:t>
-            </a:r>
-            <a:endParaRPr lang="pt-BR" dirty="0"/>
-          </a:p>
-          <a:p>
-            <a:r>
-              <a:rPr lang="pt-BR" dirty="0" err="1"/>
-              <a:t>Functional</a:t>
-            </a:r>
-            <a:r>
-              <a:rPr lang="pt-BR" dirty="0"/>
-              <a:t> </a:t>
-            </a:r>
-            <a:r>
-              <a:rPr lang="pt-BR" dirty="0" err="1"/>
-              <a:t>bounding</a:t>
-            </a:r>
-            <a:r>
-              <a:rPr lang="pt-BR" dirty="0"/>
-              <a:t> box</a:t>
-            </a:r>
-          </a:p>
-          <a:p>
-            <a:r>
-              <a:rPr lang="pt-BR" dirty="0" err="1"/>
-              <a:t>Integrate</a:t>
-            </a:r>
-            <a:r>
-              <a:rPr lang="pt-BR" dirty="0"/>
-              <a:t> capture -&gt; display point </a:t>
-            </a:r>
-            <a:r>
-              <a:rPr lang="pt-BR" dirty="0" err="1"/>
-              <a:t>clouds</a:t>
-            </a:r>
-            <a:endParaRPr lang="pt-BR" dirty="0"/>
-          </a:p>
-          <a:p>
-            <a:r>
-              <a:rPr lang="pt-BR" dirty="0"/>
-              <a:t>SQL </a:t>
-            </a:r>
-            <a:r>
-              <a:rPr lang="pt-BR" dirty="0" err="1"/>
-              <a:t>database</a:t>
-            </a:r>
-            <a:endParaRPr lang="en-US" dirty="0"/>
+              <a:t>One folder installation</a:t>
+            </a:r>
+          </a:p>
+          <a:p>
+            <a:r>
+              <a:rPr lang="tr-TR" dirty="0"/>
+              <a:t>Deployed software</a:t>
+            </a:r>
+          </a:p>
+          <a:p>
+            <a:r>
+              <a:rPr lang="tr-TR" dirty="0"/>
+              <a:t>Logger</a:t>
+            </a:r>
+          </a:p>
+          <a:p>
+            <a:r>
+              <a:rPr lang="tr-TR" dirty="0"/>
+              <a:t>GUI Friendly</a:t>
+            </a:r>
+          </a:p>
+          <a:p>
+            <a:r>
+              <a:rPr lang="tr-TR" dirty="0"/>
+              <a:t>Good documentation</a:t>
+            </a:r>
+          </a:p>
+          <a:p>
+            <a:r>
+              <a:rPr lang="tr-TR" dirty="0"/>
+              <a:t>Interfacing</a:t>
+            </a:r>
+          </a:p>
+          <a:p>
+            <a:r>
+              <a:rPr lang="tr-TR" dirty="0"/>
+              <a:t>Readable code</a:t>
+            </a:r>
+          </a:p>
+          <a:p>
+            <a:r>
+              <a:rPr lang="tr-TR" dirty="0"/>
+              <a:t>Working filters</a:t>
+            </a:r>
+          </a:p>
+          <a:p>
+            <a:r>
+              <a:rPr lang="tr-TR" dirty="0"/>
+              <a:t>Correspondence basics</a:t>
+            </a:r>
+          </a:p>
+          <a:p>
+            <a:r>
+              <a:rPr lang="tr-TR" dirty="0"/>
+              <a:t>Bounding box</a:t>
+            </a:r>
+          </a:p>
+          <a:p>
+            <a:endParaRPr lang="tr-TR" dirty="0"/>
+          </a:p>
+          <a:p>
+            <a:endParaRPr lang="tr-TR" dirty="0"/>
+          </a:p>
+          <a:p>
+            <a:endParaRPr lang="tr-TR" dirty="0"/>
+          </a:p>
+          <a:p>
+            <a:endParaRPr lang="tr-TR" dirty="0"/>
           </a:p>
         </p:txBody>
       </p:sp>
     </p:spTree>
     <p:extLst>
       <p:ext uri="{BB962C8B-B14F-4D97-AF65-F5344CB8AC3E}">
-        <p14:creationId xmlns:p14="http://schemas.microsoft.com/office/powerpoint/2010/main" val="2368338312"/>
+        <p14:creationId xmlns:p14="http://schemas.microsoft.com/office/powerpoint/2010/main" val="2232659882"/>
       </p:ext>
     </p:extLst>
   </p:cSld>
@@ -7212,7 +7132,7 @@
           <p:cNvPr id="2" name="Título 1">
             <a:extLst>
               <a:ext uri="{FF2B5EF4-FFF2-40B4-BE49-F238E27FC236}">
-                <a16:creationId xmlns:a16="http://schemas.microsoft.com/office/drawing/2014/main" id="{A48190DC-C2E4-4A5A-88BE-5F122742EDF3}"/>
+                <a16:creationId xmlns:a16="http://schemas.microsoft.com/office/drawing/2014/main" id="{70FB1208-8BC8-4079-83A3-622F33B01E23}"/>
               </a:ext>
             </a:extLst>
           </p:cNvPr>
@@ -7229,8 +7149,12 @@
           <a:lstStyle/>
           <a:p>
             <a:r>
+              <a:rPr lang="pt-BR" dirty="0"/>
+              <a:t>Future </a:t>
+            </a:r>
+            <a:r>
               <a:rPr lang="pt-BR" dirty="0" err="1"/>
-              <a:t>Conclusion</a:t>
+              <a:t>Work</a:t>
             </a:r>
             <a:endParaRPr lang="en-US" dirty="0"/>
           </a:p>
@@ -7241,7 +7165,7 @@
           <p:cNvPr id="3" name="Espaço Reservado para Conteúdo 2">
             <a:extLst>
               <a:ext uri="{FF2B5EF4-FFF2-40B4-BE49-F238E27FC236}">
-                <a16:creationId xmlns:a16="http://schemas.microsoft.com/office/drawing/2014/main" id="{A3528BCA-9E75-49E5-A2C7-4AB1D4D5FD79}"/>
+                <a16:creationId xmlns:a16="http://schemas.microsoft.com/office/drawing/2014/main" id="{A6486A13-9AFB-4B89-A1CB-332FEB8DE68C}"/>
               </a:ext>
             </a:extLst>
           </p:cNvPr>
@@ -7259,43 +7183,14 @@
           <a:p>
             <a:r>
               <a:rPr lang="pt-BR" dirty="0" err="1"/>
-              <a:t>Challenging</a:t>
-            </a:r>
-            <a:r>
-              <a:rPr lang="pt-BR" dirty="0"/>
-              <a:t> Project</a:t>
-            </a:r>
-          </a:p>
-          <a:p>
-            <a:r>
-              <a:rPr lang="pt-BR" dirty="0"/>
-              <a:t>Focus:</a:t>
-            </a:r>
-          </a:p>
-          <a:p>
-            <a:pPr lvl="1"/>
-            <a:r>
-              <a:rPr lang="pt-BR" dirty="0"/>
-              <a:t>- </a:t>
-            </a:r>
+              <a:t>Meshing</a:t>
+            </a:r>
+            <a:endParaRPr lang="pt-BR" dirty="0"/>
+          </a:p>
+          <a:p>
             <a:r>
               <a:rPr lang="pt-BR" dirty="0" err="1"/>
-              <a:t>Perfect</a:t>
-            </a:r>
-            <a:r>
-              <a:rPr lang="pt-BR" dirty="0"/>
-              <a:t> Software</a:t>
-            </a:r>
-          </a:p>
-          <a:p>
-            <a:pPr lvl="1"/>
-            <a:r>
-              <a:rPr lang="pt-BR" dirty="0"/>
-              <a:t>+ Project design </a:t>
-            </a:r>
-            <a:r>
-              <a:rPr lang="pt-BR" dirty="0" err="1"/>
-              <a:t>and</a:t>
+              <a:t>Good</a:t>
             </a:r>
             <a:r>
               <a:rPr lang="pt-BR" dirty="0"/>
@@ -7303,7 +7198,14 @@
             </a:r>
             <a:r>
               <a:rPr lang="pt-BR" dirty="0" err="1"/>
-              <a:t>coding</a:t>
+              <a:t>parameters</a:t>
+            </a:r>
+            <a:endParaRPr lang="pt-BR" dirty="0"/>
+          </a:p>
+          <a:p>
+            <a:r>
+              <a:rPr lang="pt-BR" dirty="0" err="1"/>
+              <a:t>Redirect</a:t>
             </a:r>
             <a:r>
               <a:rPr lang="pt-BR" dirty="0"/>
@@ -7311,14 +7213,15 @@
             </a:r>
             <a:r>
               <a:rPr lang="pt-BR" dirty="0" err="1"/>
-              <a:t>habits</a:t>
-            </a:r>
-            <a:endParaRPr lang="pt-BR" dirty="0"/>
-          </a:p>
-          <a:p>
+              <a:t>std</a:t>
+            </a:r>
+            <a:r>
+              <a:rPr lang="pt-BR" dirty="0"/>
+              <a:t>::</a:t>
+            </a:r>
             <a:r>
               <a:rPr lang="pt-BR" dirty="0" err="1"/>
-              <a:t>Results</a:t>
+              <a:t>cout</a:t>
             </a:r>
             <a:r>
               <a:rPr lang="pt-BR" dirty="0"/>
@@ -7326,14 +7229,7 @@
             </a:r>
             <a:r>
               <a:rPr lang="pt-BR" dirty="0" err="1"/>
-              <a:t>achieved</a:t>
-            </a:r>
-            <a:endParaRPr lang="pt-BR" dirty="0"/>
-          </a:p>
-          <a:p>
-            <a:r>
-              <a:rPr lang="pt-BR" dirty="0" err="1"/>
-              <a:t>Good</a:t>
+              <a:t>to</a:t>
             </a:r>
             <a:r>
               <a:rPr lang="pt-BR" dirty="0"/>
@@ -7341,15 +7237,18 @@
             </a:r>
             <a:r>
               <a:rPr lang="pt-BR" dirty="0" err="1"/>
-              <a:t>starting</a:t>
-            </a:r>
+              <a:t>logger</a:t>
+            </a:r>
+            <a:endParaRPr lang="pt-BR" dirty="0"/>
+          </a:p>
+          <a:p>
             <a:r>
               <a:rPr lang="pt-BR" dirty="0"/>
-              <a:t> point for </a:t>
+              <a:t>Horizontal / Vertical </a:t>
             </a:r>
             <a:r>
               <a:rPr lang="pt-BR" dirty="0" err="1"/>
-              <a:t>next</a:t>
+              <a:t>acquisition</a:t>
             </a:r>
             <a:r>
               <a:rPr lang="pt-BR" dirty="0"/>
@@ -7357,7 +7256,35 @@
             </a:r>
             <a:r>
               <a:rPr lang="pt-BR" dirty="0" err="1"/>
-              <a:t>year’s</a:t>
+              <a:t>modes</a:t>
+            </a:r>
+            <a:endParaRPr lang="pt-BR" dirty="0"/>
+          </a:p>
+          <a:p>
+            <a:r>
+              <a:rPr lang="pt-BR" dirty="0" err="1"/>
+              <a:t>Configuration</a:t>
+            </a:r>
+            <a:r>
+              <a:rPr lang="pt-BR" dirty="0"/>
+              <a:t> files</a:t>
+            </a:r>
+          </a:p>
+          <a:p>
+            <a:r>
+              <a:rPr lang="pt-BR" dirty="0"/>
+              <a:t>Full screen </a:t>
+            </a:r>
+            <a:r>
+              <a:rPr lang="tr-TR" dirty="0"/>
+              <a:t>application</a:t>
+            </a:r>
+            <a:endParaRPr lang="pt-BR" dirty="0"/>
+          </a:p>
+          <a:p>
+            <a:r>
+              <a:rPr lang="pt-BR" dirty="0" err="1"/>
+              <a:t>Functional</a:t>
             </a:r>
             <a:r>
               <a:rPr lang="pt-BR" dirty="0"/>
@@ -7365,16 +7292,45 @@
             </a:r>
             <a:r>
               <a:rPr lang="pt-BR" dirty="0" err="1"/>
-              <a:t>students</a:t>
+              <a:t>bounding</a:t>
+            </a:r>
+            <a:r>
+              <a:rPr lang="pt-BR" dirty="0"/>
+              <a:t> box</a:t>
+            </a:r>
+          </a:p>
+          <a:p>
+            <a:r>
+              <a:rPr lang="pt-BR" dirty="0" err="1"/>
+              <a:t>Integrate</a:t>
+            </a:r>
+            <a:r>
+              <a:rPr lang="pt-BR" dirty="0"/>
+              <a:t> capture -&gt; display point </a:t>
+            </a:r>
+            <a:r>
+              <a:rPr lang="pt-BR" dirty="0" err="1"/>
+              <a:t>clouds</a:t>
             </a:r>
             <a:endParaRPr lang="pt-BR" dirty="0"/>
+          </a:p>
+          <a:p>
+            <a:r>
+              <a:rPr lang="pt-BR" dirty="0"/>
+              <a:t>SQL </a:t>
+            </a:r>
+            <a:r>
+              <a:rPr lang="pt-BR" dirty="0" err="1"/>
+              <a:t>database</a:t>
+            </a:r>
+            <a:endParaRPr lang="en-US" dirty="0"/>
           </a:p>
         </p:txBody>
       </p:sp>
     </p:spTree>
     <p:extLst>
       <p:ext uri="{BB962C8B-B14F-4D97-AF65-F5344CB8AC3E}">
-        <p14:creationId xmlns:p14="http://schemas.microsoft.com/office/powerpoint/2010/main" val="2488445855"/>
+        <p14:creationId xmlns:p14="http://schemas.microsoft.com/office/powerpoint/2010/main" val="2368338312"/>
       </p:ext>
     </p:extLst>
   </p:cSld>
@@ -7403,51 +7359,172 @@
       </p:grpSpPr>
       <p:sp>
         <p:nvSpPr>
-          <p:cNvPr id="2" name="Subtítulo 1">
-            <a:extLst>
-              <a:ext uri="{FF2B5EF4-FFF2-40B4-BE49-F238E27FC236}">
-                <a16:creationId xmlns:a16="http://schemas.microsoft.com/office/drawing/2014/main" id="{6B063FBE-B332-4483-9E00-637E662CEAC4}"/>
-              </a:ext>
-            </a:extLst>
-          </p:cNvPr>
-          <p:cNvSpPr>
-            <a:spLocks noGrp="1"/>
-          </p:cNvSpPr>
-          <p:nvPr>
-            <p:ph type="subTitle" idx="1"/>
+          <p:cNvPr id="2" name="Título 1">
+            <a:extLst>
+              <a:ext uri="{FF2B5EF4-FFF2-40B4-BE49-F238E27FC236}">
+                <a16:creationId xmlns:a16="http://schemas.microsoft.com/office/drawing/2014/main" id="{A48190DC-C2E4-4A5A-88BE-5F122742EDF3}"/>
+              </a:ext>
+            </a:extLst>
+          </p:cNvPr>
+          <p:cNvSpPr>
+            <a:spLocks noGrp="1"/>
+          </p:cNvSpPr>
+          <p:nvPr>
+            <p:ph type="title"/>
           </p:nvPr>
         </p:nvSpPr>
         <p:spPr/>
         <p:txBody>
-          <a:bodyPr>
-            <a:normAutofit/>
-          </a:bodyPr>
-          <a:lstStyle/>
-          <a:p>
-            <a:r>
-              <a:rPr lang="pt-BR" sz="4000" dirty="0" err="1"/>
-              <a:t>Thank</a:t>
-            </a:r>
-            <a:r>
-              <a:rPr lang="pt-BR" sz="4000" dirty="0"/>
+          <a:bodyPr/>
+          <a:lstStyle/>
+          <a:p>
+            <a:r>
+              <a:rPr lang="pt-BR" dirty="0" err="1"/>
+              <a:t>Conclusion</a:t>
+            </a:r>
+            <a:endParaRPr lang="en-US" dirty="0"/>
+          </a:p>
+        </p:txBody>
+      </p:sp>
+      <p:sp>
+        <p:nvSpPr>
+          <p:cNvPr id="3" name="Espaço Reservado para Conteúdo 2">
+            <a:extLst>
+              <a:ext uri="{FF2B5EF4-FFF2-40B4-BE49-F238E27FC236}">
+                <a16:creationId xmlns:a16="http://schemas.microsoft.com/office/drawing/2014/main" id="{A3528BCA-9E75-49E5-A2C7-4AB1D4D5FD79}"/>
+              </a:ext>
+            </a:extLst>
+          </p:cNvPr>
+          <p:cNvSpPr>
+            <a:spLocks noGrp="1"/>
+          </p:cNvSpPr>
+          <p:nvPr>
+            <p:ph idx="1"/>
+          </p:nvPr>
+        </p:nvSpPr>
+        <p:spPr/>
+        <p:txBody>
+          <a:bodyPr/>
+          <a:lstStyle/>
+          <a:p>
+            <a:r>
+              <a:rPr lang="pt-BR" dirty="0" err="1"/>
+              <a:t>Challenging</a:t>
+            </a:r>
+            <a:r>
+              <a:rPr lang="pt-BR" dirty="0"/>
+              <a:t> Project</a:t>
+            </a:r>
+          </a:p>
+          <a:p>
+            <a:r>
+              <a:rPr lang="pt-BR" dirty="0"/>
+              <a:t>Focus:</a:t>
+            </a:r>
+          </a:p>
+          <a:p>
+            <a:pPr lvl="1"/>
+            <a:r>
+              <a:rPr lang="pt-BR" dirty="0"/>
+              <a:t>- </a:t>
+            </a:r>
+            <a:r>
+              <a:rPr lang="pt-BR" dirty="0" err="1"/>
+              <a:t>Perfect</a:t>
+            </a:r>
+            <a:r>
+              <a:rPr lang="pt-BR" dirty="0"/>
+              <a:t> Software</a:t>
+            </a:r>
+          </a:p>
+          <a:p>
+            <a:pPr lvl="1"/>
+            <a:r>
+              <a:rPr lang="pt-BR" dirty="0"/>
+              <a:t>+ Project design </a:t>
+            </a:r>
+            <a:r>
+              <a:rPr lang="pt-BR" dirty="0" err="1"/>
+              <a:t>and</a:t>
+            </a:r>
+            <a:r>
+              <a:rPr lang="pt-BR" dirty="0"/>
               <a:t> </a:t>
             </a:r>
             <a:r>
-              <a:rPr lang="pt-BR" sz="4000" dirty="0" err="1"/>
-              <a:t>you</a:t>
-            </a:r>
-            <a:r>
-              <a:rPr lang="pt-BR" sz="4000" dirty="0"/>
-              <a:t>!</a:t>
-            </a:r>
-            <a:endParaRPr lang="en-US" sz="4000" dirty="0"/>
+              <a:rPr lang="pt-BR" dirty="0" err="1"/>
+              <a:t>coding</a:t>
+            </a:r>
+            <a:r>
+              <a:rPr lang="pt-BR" dirty="0"/>
+              <a:t> </a:t>
+            </a:r>
+            <a:r>
+              <a:rPr lang="pt-BR" dirty="0" err="1"/>
+              <a:t>habits</a:t>
+            </a:r>
+            <a:endParaRPr lang="pt-BR" dirty="0"/>
+          </a:p>
+          <a:p>
+            <a:r>
+              <a:rPr lang="pt-BR" dirty="0" err="1"/>
+              <a:t>Results</a:t>
+            </a:r>
+            <a:r>
+              <a:rPr lang="pt-BR" dirty="0"/>
+              <a:t> </a:t>
+            </a:r>
+            <a:r>
+              <a:rPr lang="pt-BR" dirty="0" err="1"/>
+              <a:t>achieved</a:t>
+            </a:r>
+            <a:endParaRPr lang="pt-BR" dirty="0"/>
+          </a:p>
+          <a:p>
+            <a:r>
+              <a:rPr lang="pt-BR" dirty="0" err="1"/>
+              <a:t>Good</a:t>
+            </a:r>
+            <a:r>
+              <a:rPr lang="pt-BR" dirty="0"/>
+              <a:t> </a:t>
+            </a:r>
+            <a:r>
+              <a:rPr lang="pt-BR" dirty="0" err="1"/>
+              <a:t>starting</a:t>
+            </a:r>
+            <a:r>
+              <a:rPr lang="pt-BR" dirty="0"/>
+              <a:t> point for </a:t>
+            </a:r>
+            <a:r>
+              <a:rPr lang="pt-BR" dirty="0" err="1"/>
+              <a:t>next</a:t>
+            </a:r>
+            <a:r>
+              <a:rPr lang="pt-BR" dirty="0"/>
+              <a:t> </a:t>
+            </a:r>
+            <a:r>
+              <a:rPr lang="pt-BR" dirty="0" err="1"/>
+              <a:t>year’s</a:t>
+            </a:r>
+            <a:r>
+              <a:rPr lang="pt-BR" dirty="0"/>
+              <a:t> </a:t>
+            </a:r>
+            <a:r>
+              <a:rPr lang="pt-BR" dirty="0" err="1"/>
+              <a:t>students</a:t>
+            </a:r>
+            <a:endParaRPr lang="pt-BR" dirty="0"/>
           </a:p>
         </p:txBody>
       </p:sp>
     </p:spTree>
     <p:extLst>
       <p:ext uri="{BB962C8B-B14F-4D97-AF65-F5344CB8AC3E}">
-        <p14:creationId xmlns:p14="http://schemas.microsoft.com/office/powerpoint/2010/main" val="3998744856"/>
+        <p14:creationId xmlns:p14="http://schemas.microsoft.com/office/powerpoint/2010/main" val="2488445855"/>
       </p:ext>
     </p:extLst>
   </p:cSld>
@@ -7563,6 +7640,79 @@
           <a:chExt cx="0" cy="0"/>
         </a:xfrm>
       </p:grpSpPr>
+      <p:sp>
+        <p:nvSpPr>
+          <p:cNvPr id="2" name="Subtítulo 1">
+            <a:extLst>
+              <a:ext uri="{FF2B5EF4-FFF2-40B4-BE49-F238E27FC236}">
+                <a16:creationId xmlns:a16="http://schemas.microsoft.com/office/drawing/2014/main" id="{6B063FBE-B332-4483-9E00-637E662CEAC4}"/>
+              </a:ext>
+            </a:extLst>
+          </p:cNvPr>
+          <p:cNvSpPr>
+            <a:spLocks noGrp="1"/>
+          </p:cNvSpPr>
+          <p:nvPr>
+            <p:ph type="subTitle" idx="1"/>
+          </p:nvPr>
+        </p:nvSpPr>
+        <p:spPr/>
+        <p:txBody>
+          <a:bodyPr>
+            <a:normAutofit/>
+          </a:bodyPr>
+          <a:lstStyle/>
+          <a:p>
+            <a:r>
+              <a:rPr lang="pt-BR" sz="4000" dirty="0" err="1"/>
+              <a:t>Thank</a:t>
+            </a:r>
+            <a:r>
+              <a:rPr lang="pt-BR" sz="4000" dirty="0"/>
+              <a:t> </a:t>
+            </a:r>
+            <a:r>
+              <a:rPr lang="pt-BR" sz="4000" dirty="0" err="1"/>
+              <a:t>you</a:t>
+            </a:r>
+            <a:r>
+              <a:rPr lang="pt-BR" sz="4000" dirty="0"/>
+              <a:t>!</a:t>
+            </a:r>
+            <a:endParaRPr lang="en-US" sz="4000" dirty="0"/>
+          </a:p>
+        </p:txBody>
+      </p:sp>
+    </p:spTree>
+    <p:extLst>
+      <p:ext uri="{BB962C8B-B14F-4D97-AF65-F5344CB8AC3E}">
+        <p14:creationId xmlns:p14="http://schemas.microsoft.com/office/powerpoint/2010/main" val="3998744856"/>
+      </p:ext>
+    </p:extLst>
+  </p:cSld>
+  <p:clrMapOvr>
+    <a:masterClrMapping/>
+  </p:clrMapOvr>
+</p:sld>
+</file>
+
+<file path=ppt/slides/slide31.xml><?xml version="1.0" encoding="utf-8"?>
+<p:sld xmlns:a="http://schemas.openxmlformats.org/drawingml/2006/main" xmlns:r="http://schemas.openxmlformats.org/officeDocument/2006/relationships" xmlns:p="http://schemas.openxmlformats.org/presentationml/2006/main">
+  <p:cSld>
+    <p:spTree>
+      <p:nvGrpSpPr>
+        <p:cNvPr id="1" name=""/>
+        <p:cNvGrpSpPr/>
+        <p:nvPr/>
+      </p:nvGrpSpPr>
+      <p:grpSpPr>
+        <a:xfrm>
+          <a:off x="0" y="0"/>
+          <a:ext cx="0" cy="0"/>
+          <a:chOff x="0" y="0"/>
+          <a:chExt cx="0" cy="0"/>
+        </a:xfrm>
+      </p:grpSpPr>
       <p:pic>
         <p:nvPicPr>
           <p:cNvPr id="5" name="Picture 4">
@@ -7876,7 +8026,23 @@
             <a:pPr lvl="1"/>
             <a:r>
               <a:rPr lang="tr-TR" dirty="0"/>
-              <a:t>Software Design &amp; team leading</a:t>
+              <a:t>Software Design &amp; </a:t>
+            </a:r>
+            <a:r>
+              <a:rPr lang="pt-BR" dirty="0"/>
+              <a:t>T</a:t>
+            </a:r>
+            <a:r>
+              <a:rPr lang="tr-TR" dirty="0"/>
+              <a:t>eam </a:t>
+            </a:r>
+            <a:r>
+              <a:rPr lang="pt-BR" dirty="0"/>
+              <a:t>L</a:t>
+            </a:r>
+            <a:r>
+              <a:rPr lang="tr-TR" dirty="0"/>
+              <a:t>eading</a:t>
             </a:r>
           </a:p>
           <a:p>
@@ -8063,6 +8229,10 @@
           <a:bodyPr/>
           <a:lstStyle/>
           <a:p>
+            <a:r>
+              <a:rPr lang="pt-BR" dirty="0"/>
+              <a:t> </a:t>
+            </a:r>
             <a:endParaRPr lang="tr-TR" dirty="0"/>
           </a:p>
         </p:txBody>

</xml_diff>